<commit_message>
Updated slides for current session
</commit_message>
<xml_diff>
--- a/WebScraping_course/WebScrapping-1a-HTML & CSS.pptx
+++ b/WebScraping_course/WebScrapping-1a-HTML & CSS.pptx
@@ -6,7 +6,7 @@
     <p:sldMasterId id="2147483649" r:id="rId2"/>
   </p:sldMasterIdLst>
   <p:notesMasterIdLst>
-    <p:notesMasterId r:id="rId45"/>
+    <p:notesMasterId r:id="rId46"/>
   </p:notesMasterIdLst>
   <p:sldIdLst>
     <p:sldId id="256" r:id="rId3"/>
@@ -47,10 +47,11 @@
     <p:sldId id="298" r:id="rId38"/>
     <p:sldId id="296" r:id="rId39"/>
     <p:sldId id="297" r:id="rId40"/>
-    <p:sldId id="293" r:id="rId41"/>
-    <p:sldId id="300" r:id="rId42"/>
-    <p:sldId id="295" r:id="rId43"/>
-    <p:sldId id="294" r:id="rId44"/>
+    <p:sldId id="301" r:id="rId41"/>
+    <p:sldId id="293" r:id="rId42"/>
+    <p:sldId id="300" r:id="rId43"/>
+    <p:sldId id="295" r:id="rId44"/>
+    <p:sldId id="294" r:id="rId45"/>
   </p:sldIdLst>
   <p:sldSz cx="9144000" cy="6858000" type="screen4x3"/>
   <p:notesSz cx="6858000" cy="9144000"/>
@@ -11518,7 +11519,7 @@
                 </a:solidFill>
                 <a:latin typeface="Arial" charset="0"/>
               </a:rPr>
-              <a:t> HTML doc.</a:t>
+              <a:t> HTML</a:t>
             </a:r>
           </a:p>
         </p:txBody>
@@ -11939,74 +11940,6 @@
               </a:solidFill>
               <a:latin typeface="Courier New" pitchFamily="49" charset="0"/>
             </a:endParaRPr>
-          </a:p>
-        </p:txBody>
-      </p:sp>
-      <p:sp>
-        <p:nvSpPr>
-          <p:cNvPr id="14339" name="Text Box 3"/>
-          <p:cNvSpPr txBox="1">
-            <a:spLocks noChangeArrowheads="1"/>
-          </p:cNvSpPr>
-          <p:nvPr/>
-        </p:nvSpPr>
-        <p:spPr bwMode="auto">
-          <a:xfrm>
-            <a:off x="503238" y="4751388"/>
-            <a:ext cx="6507162" cy="365125"/>
-          </a:xfrm>
-          <a:prstGeom prst="rect">
-            <a:avLst/>
-          </a:prstGeom>
-          <a:noFill/>
-          <a:ln w="9525" cap="flat">
-            <a:noFill/>
-            <a:round/>
-            <a:headEnd/>
-            <a:tailEnd/>
-          </a:ln>
-          <a:effectLst/>
-        </p:spPr>
-        <p:txBody>
-          <a:bodyPr wrap="none" lIns="90000" tIns="45000" rIns="90000" bIns="45000"/>
-          <a:lstStyle/>
-          <a:p>
-            <a:pPr>
-              <a:buClrTx/>
-              <a:buFontTx/>
-              <a:buNone/>
-              <a:tabLst>
-                <a:tab pos="0" algn="l"/>
-                <a:tab pos="447675" algn="l"/>
-                <a:tab pos="896938" algn="l"/>
-                <a:tab pos="1346200" algn="l"/>
-                <a:tab pos="1795463" algn="l"/>
-                <a:tab pos="2244725" algn="l"/>
-                <a:tab pos="2693988" algn="l"/>
-                <a:tab pos="3143250" algn="l"/>
-                <a:tab pos="3592513" algn="l"/>
-                <a:tab pos="4041775" algn="l"/>
-                <a:tab pos="4491038" algn="l"/>
-                <a:tab pos="4940300" algn="l"/>
-                <a:tab pos="5389563" algn="l"/>
-                <a:tab pos="5838825" algn="l"/>
-                <a:tab pos="6288088" algn="l"/>
-                <a:tab pos="6737350" algn="l"/>
-                <a:tab pos="7186613" algn="l"/>
-                <a:tab pos="7635875" algn="l"/>
-                <a:tab pos="8085138" algn="l"/>
-                <a:tab pos="8534400" algn="l"/>
-                <a:tab pos="8983663" algn="l"/>
-              </a:tabLst>
-            </a:pPr>
-            <a:r>
-              <a:rPr lang="ca-ES" sz="1800" dirty="0">
-                <a:solidFill>
-                  <a:srgbClr val="000000"/>
-                </a:solidFill>
-              </a:rPr>
-              <a:t>http://www.r-datacollection.com/materials/html/OurFirstHTML.html</a:t>
-            </a:r>
           </a:p>
         </p:txBody>
       </p:sp>
@@ -22010,7 +21943,7 @@
 </file>
 
 <file path=ppt/slides/slide25.xml><?xml version="1.0" encoding="utf-8"?>
-<p:sld xmlns:a="http://schemas.openxmlformats.org/drawingml/2006/main" xmlns:r="http://schemas.openxmlformats.org/officeDocument/2006/relationships" xmlns:p="http://schemas.openxmlformats.org/presentationml/2006/main" show="0">
+<p:sld xmlns:a="http://schemas.openxmlformats.org/drawingml/2006/main" xmlns:r="http://schemas.openxmlformats.org/officeDocument/2006/relationships" xmlns:p="http://schemas.openxmlformats.org/presentationml/2006/main">
   <p:cSld>
     <p:bg>
       <p:bgPr>
@@ -22563,7 +22496,7 @@
 </file>
 
 <file path=ppt/slides/slide26.xml><?xml version="1.0" encoding="utf-8"?>
-<p:sld xmlns:a="http://schemas.openxmlformats.org/drawingml/2006/main" xmlns:r="http://schemas.openxmlformats.org/officeDocument/2006/relationships" xmlns:p="http://schemas.openxmlformats.org/presentationml/2006/main" show="0">
+<p:sld xmlns:a="http://schemas.openxmlformats.org/drawingml/2006/main" xmlns:r="http://schemas.openxmlformats.org/officeDocument/2006/relationships" xmlns:p="http://schemas.openxmlformats.org/presentationml/2006/main">
   <p:cSld>
     <p:bg>
       <p:bgPr>
@@ -25028,21 +24961,33 @@
             <a:pPr lvl="1"/>
             <a:r>
               <a:rPr lang="en-US" sz="2000" dirty="0"/>
-              <a:t>1) Tag (or Type) selectors (body, p, div, a)</a:t>
+              <a:t>1) Tag (or Type) selectors (body, p, div, a): </a:t>
+            </a:r>
+            <a:r>
+              <a:rPr lang="en-US" sz="2000" i="1" dirty="0"/>
+              <a:t>Redefine existing tags</a:t>
             </a:r>
           </a:p>
           <a:p>
             <a:pPr lvl="1"/>
             <a:r>
               <a:rPr lang="en-US" sz="2000" dirty="0"/>
-              <a:t>2) Class selectors (.content, .menu)</a:t>
+              <a:t>2) Class selectors (.content, .menu): </a:t>
+            </a:r>
+            <a:r>
+              <a:rPr lang="en-US" sz="2000" i="1" dirty="0"/>
+              <a:t>Define a new type of tag</a:t>
             </a:r>
           </a:p>
           <a:p>
             <a:pPr lvl="1"/>
             <a:r>
               <a:rPr lang="en-US" sz="2000" dirty="0"/>
-              <a:t>3) ID selectors (#wrapper, #sidebar)</a:t>
+              <a:t>3) ID selectors (#wrapper, #sidebar): </a:t>
+            </a:r>
+            <a:r>
+              <a:rPr lang="en-US" sz="2000" i="1" dirty="0"/>
+              <a:t>Create and name a new tag</a:t>
             </a:r>
           </a:p>
           <a:p>
@@ -25137,7 +25082,7 @@
           <a:p>
             <a:r>
               <a:rPr lang="ca-ES" dirty="0" err="1"/>
-              <a:t>Type</a:t>
+              <a:t>Tag</a:t>
             </a:r>
             <a:r>
               <a:rPr lang="ca-ES" dirty="0"/>
@@ -25575,16 +25520,16 @@
           <a:lstStyle/>
           <a:p>
             <a:r>
-              <a:rPr lang="en-US" sz="1600" b="0" i="1" dirty="0"/>
+              <a:rPr lang="en-US" sz="1800" b="0" i="1" dirty="0"/>
               <a:t>Allow selecting an element based on</a:t>
             </a:r>
           </a:p>
           <a:p>
             <a:r>
-              <a:rPr lang="en-US" sz="1600" b="0" i="1" dirty="0"/>
+              <a:rPr lang="en-US" sz="1800" b="0" i="1" dirty="0"/>
               <a:t>the element’s class attribute value.</a:t>
             </a:r>
-            <a:endParaRPr lang="ca-ES" sz="1600" b="0" i="1" dirty="0"/>
+            <a:endParaRPr lang="ca-ES" sz="1800" b="0" i="1" dirty="0"/>
           </a:p>
         </p:txBody>
       </p:sp>
@@ -25856,16 +25801,21 @@
             <p:ph type="body" idx="1"/>
           </p:nvPr>
         </p:nvSpPr>
-        <p:spPr/>
+        <p:spPr>
+          <a:xfrm>
+            <a:off x="107504" y="1535113"/>
+            <a:ext cx="4464496" cy="639762"/>
+          </a:xfrm>
+        </p:spPr>
         <p:txBody>
           <a:bodyPr/>
           <a:lstStyle/>
           <a:p>
             <a:r>
-              <a:rPr lang="en-US" sz="1600" b="0" i="1" dirty="0"/>
+              <a:rPr lang="en-US" sz="1800" b="0" i="1" dirty="0"/>
               <a:t>More precise than class selectors, as they target only one unique element at a time</a:t>
             </a:r>
-            <a:endParaRPr lang="ca-ES" sz="1600" b="0" i="1" dirty="0"/>
+            <a:endParaRPr lang="ca-ES" sz="1800" b="0" i="1" dirty="0"/>
           </a:p>
         </p:txBody>
       </p:sp>
@@ -26073,7 +26023,7 @@
                 <a:latin typeface="Courier New" panose="02070309020205020404" pitchFamily="49" charset="0"/>
                 <a:cs typeface="Courier New" panose="02070309020205020404" pitchFamily="49" charset="0"/>
               </a:rPr>
-              <a:t>=“</a:t>
+              <a:t>="</a:t>
             </a:r>
             <a:r>
               <a:rPr lang="ca-ES" sz="2000" dirty="0" err="1">
@@ -26087,7 +26037,7 @@
                 <a:latin typeface="Courier New" panose="02070309020205020404" pitchFamily="49" charset="0"/>
                 <a:cs typeface="Courier New" panose="02070309020205020404" pitchFamily="49" charset="0"/>
               </a:rPr>
-              <a:t>”&gt;… &lt;/div&gt;</a:t>
+              <a:t>"&gt;… &lt;/div&gt;</a:t>
             </a:r>
           </a:p>
         </p:txBody>
@@ -26157,7 +26107,7 @@
           <p:cNvPr id="2" name="Título 1">
             <a:extLst>
               <a:ext uri="{FF2B5EF4-FFF2-40B4-BE49-F238E27FC236}">
-                <a16:creationId xmlns:a16="http://schemas.microsoft.com/office/drawing/2014/main" id="{34A87344-004A-4894-AB06-BCC475305E40}"/>
+                <a16:creationId xmlns:a16="http://schemas.microsoft.com/office/drawing/2014/main" id="{9C5F9641-5F2A-46D0-AED2-3DE359D90F1D}"/>
               </a:ext>
             </a:extLst>
           </p:cNvPr>
@@ -26168,82 +26118,1728 @@
             <p:ph type="title"/>
           </p:nvPr>
         </p:nvSpPr>
+        <p:spPr/>
+        <p:txBody>
+          <a:bodyPr/>
+          <a:lstStyle/>
+          <a:p>
+            <a:r>
+              <a:rPr lang="en-US" dirty="0">
+                <a:latin typeface="Courier New" panose="02070309020205020404" pitchFamily="49" charset="0"/>
+                <a:cs typeface="Courier New" panose="02070309020205020404" pitchFamily="49" charset="0"/>
+              </a:rPr>
+              <a:t>Class</a:t>
+            </a:r>
+            <a:r>
+              <a:rPr lang="en-US" dirty="0"/>
+              <a:t> vs </a:t>
+            </a:r>
+            <a:r>
+              <a:rPr lang="en-US" dirty="0">
+                <a:latin typeface="Courier New" panose="02070309020205020404" pitchFamily="49" charset="0"/>
+                <a:cs typeface="Courier New" panose="02070309020205020404" pitchFamily="49" charset="0"/>
+              </a:rPr>
+              <a:t>ID</a:t>
+            </a:r>
+            <a:r>
+              <a:rPr lang="en-US" dirty="0"/>
+              <a:t> selectors</a:t>
+            </a:r>
+          </a:p>
+        </p:txBody>
+      </p:sp>
+      <p:sp>
+        <p:nvSpPr>
+          <p:cNvPr id="4" name="Marcador de contenido 3">
+            <a:extLst>
+              <a:ext uri="{FF2B5EF4-FFF2-40B4-BE49-F238E27FC236}">
+                <a16:creationId xmlns:a16="http://schemas.microsoft.com/office/drawing/2014/main" id="{01CF8566-796B-46C1-8FC3-4314FE0B0999}"/>
+              </a:ext>
+            </a:extLst>
+          </p:cNvPr>
+          <p:cNvSpPr>
+            <a:spLocks noGrp="1"/>
+          </p:cNvSpPr>
+          <p:nvPr>
+            <p:ph sz="half" idx="2"/>
+          </p:nvPr>
+        </p:nvSpPr>
         <p:spPr>
           <a:xfrm>
-            <a:off x="457200" y="371475"/>
-            <a:ext cx="8220075" cy="609253"/>
+            <a:off x="251520" y="1912985"/>
+            <a:ext cx="4040188" cy="3951288"/>
           </a:xfrm>
         </p:spPr>
         <p:txBody>
           <a:bodyPr/>
           <a:lstStyle/>
           <a:p>
-            <a:r>
-              <a:rPr lang="ca-ES" dirty="0" err="1"/>
-              <a:t>How</a:t>
-            </a:r>
-            <a:r>
-              <a:rPr lang="ca-ES" dirty="0"/>
-              <a:t> CSS </a:t>
-            </a:r>
-            <a:r>
-              <a:rPr lang="ca-ES" dirty="0" err="1"/>
-              <a:t>styles</a:t>
-            </a:r>
-            <a:r>
-              <a:rPr lang="ca-ES" dirty="0"/>
-              <a:t> </a:t>
-            </a:r>
-            <a:r>
-              <a:rPr lang="ca-ES" dirty="0" err="1"/>
-              <a:t>are</a:t>
-            </a:r>
-            <a:r>
-              <a:rPr lang="ca-ES" dirty="0"/>
-              <a:t> </a:t>
-            </a:r>
-            <a:r>
-              <a:rPr lang="ca-ES" dirty="0" err="1"/>
-              <a:t>used</a:t>
-            </a:r>
-            <a:endParaRPr lang="ca-ES" dirty="0"/>
+            <a:pPr>
+              <a:buFont typeface="Arial" panose="020B0604020202020204" pitchFamily="34" charset="0"/>
+              <a:buChar char="•"/>
+            </a:pPr>
+            <a:r>
+              <a:rPr lang="en-US" dirty="0"/>
+              <a:t>The difference between an ID and a class is that</a:t>
+            </a:r>
+          </a:p>
+          <a:p>
+            <a:pPr lvl="1">
+              <a:buFont typeface="Arial" panose="020B0604020202020204" pitchFamily="34" charset="0"/>
+              <a:buChar char="•"/>
+            </a:pPr>
+            <a:r>
+              <a:rPr lang="en-US" dirty="0"/>
+              <a:t> an ID can be used to identify </a:t>
+            </a:r>
+            <a:r>
+              <a:rPr lang="en-US" b="1" i="1" dirty="0"/>
+              <a:t>one element</a:t>
+            </a:r>
+            <a:r>
+              <a:rPr lang="en-US" dirty="0"/>
+              <a:t>,</a:t>
+            </a:r>
+          </a:p>
+          <a:p>
+            <a:pPr lvl="1">
+              <a:buFont typeface="Arial" panose="020B0604020202020204" pitchFamily="34" charset="0"/>
+              <a:buChar char="•"/>
+            </a:pPr>
+            <a:r>
+              <a:rPr lang="en-US" dirty="0"/>
+              <a:t> whereas a class can be used to identify </a:t>
+            </a:r>
+            <a:r>
+              <a:rPr lang="en-US" b="1" i="1" dirty="0"/>
+              <a:t>more than one.</a:t>
+            </a:r>
           </a:p>
         </p:txBody>
       </p:sp>
-      <p:pic>
-        <p:nvPicPr>
-          <p:cNvPr id="4" name="Imagen 3">
+      <p:sp>
+        <p:nvSpPr>
+          <p:cNvPr id="7" name="Rectangle 1">
             <a:extLst>
               <a:ext uri="{FF2B5EF4-FFF2-40B4-BE49-F238E27FC236}">
-                <a16:creationId xmlns:a16="http://schemas.microsoft.com/office/drawing/2014/main" id="{11F061A5-C0BD-4679-B46D-D855BCC79171}"/>
+                <a16:creationId xmlns:a16="http://schemas.microsoft.com/office/drawing/2014/main" id="{5A16154D-5A83-43E5-995C-B626B89EB7B1}"/>
               </a:ext>
             </a:extLst>
           </p:cNvPr>
-          <p:cNvPicPr>
-            <a:picLocks noChangeAspect="1"/>
-          </p:cNvPicPr>
-          <p:nvPr/>
-        </p:nvPicPr>
-        <p:blipFill>
-          <a:blip r:embed="rId2"/>
-          <a:stretch>
-            <a:fillRect/>
-          </a:stretch>
-        </p:blipFill>
-        <p:spPr>
+          <p:cNvSpPr>
+            <a:spLocks noGrp="1" noChangeArrowheads="1"/>
+          </p:cNvSpPr>
+          <p:nvPr>
+            <p:ph sz="quarter" idx="4"/>
+          </p:nvPr>
+        </p:nvSpPr>
+        <p:spPr bwMode="auto">
           <a:xfrm>
-            <a:off x="323528" y="1124744"/>
-            <a:ext cx="8220075" cy="5499692"/>
+            <a:off x="4583484" y="1876765"/>
+            <a:ext cx="3444899" cy="1107996"/>
           </a:xfrm>
           <a:prstGeom prst="rect">
             <a:avLst/>
           </a:prstGeom>
+          <a:solidFill>
+            <a:srgbClr val="FFFFFF"/>
+          </a:solidFill>
+          <a:ln>
+            <a:noFill/>
+          </a:ln>
+          <a:effectLst/>
+          <a:extLst>
+            <a:ext uri="{91240B29-F687-4F45-9708-019B960494DF}">
+              <a14:hiddenLine xmlns:a14="http://schemas.microsoft.com/office/drawing/2010/main" w="9525">
+                <a:solidFill>
+                  <a:schemeClr val="tx1"/>
+                </a:solidFill>
+                <a:miter lim="800000"/>
+                <a:headEnd/>
+                <a:tailEnd/>
+              </a14:hiddenLine>
+            </a:ext>
+            <a:ext uri="{AF507438-7753-43E0-B8FC-AC1667EBCBE1}">
+              <a14:hiddenEffects xmlns:a14="http://schemas.microsoft.com/office/drawing/2010/main">
+                <a:effectLst>
+                  <a:outerShdw dist="35921" dir="2700000" algn="ctr" rotWithShape="0">
+                    <a:schemeClr val="bg2"/>
+                  </a:outerShdw>
+                </a:effectLst>
+              </a14:hiddenEffects>
+            </a:ext>
+          </a:extLst>
         </p:spPr>
-      </p:pic>
+        <p:txBody>
+          <a:bodyPr vert="horz" wrap="square" lIns="0" tIns="0" rIns="0" bIns="0" numCol="1" anchor="ctr" anchorCtr="0" compatLnSpc="1">
+            <a:prstTxWarp prst="textNoShape">
+              <a:avLst/>
+            </a:prstTxWarp>
+            <a:spAutoFit/>
+          </a:bodyPr>
+          <a:lstStyle/>
+          <a:p>
+            <a:pPr marL="0" marR="0" lvl="0" indent="0" algn="l" defTabSz="914400" rtl="0" eaLnBrk="0" fontAlgn="base" latinLnBrk="0" hangingPunct="0">
+              <a:lnSpc>
+                <a:spcPct val="100000"/>
+              </a:lnSpc>
+              <a:spcBef>
+                <a:spcPct val="0"/>
+              </a:spcBef>
+              <a:spcAft>
+                <a:spcPct val="0"/>
+              </a:spcAft>
+              <a:buClrTx/>
+              <a:buSzTx/>
+              <a:buFontTx/>
+              <a:buNone/>
+              <a:tabLst/>
+            </a:pPr>
+            <a:r>
+              <a:rPr kumimoji="0" lang="es-ES" altLang="es-ES" sz="1400" b="1" i="0" u="none" strike="noStrike" cap="none" normalizeH="0" baseline="0" dirty="0">
+                <a:ln>
+                  <a:noFill/>
+                </a:ln>
+                <a:solidFill>
+                  <a:srgbClr val="669900"/>
+                </a:solidFill>
+                <a:effectLst/>
+                <a:latin typeface="Source Code Pro" panose="020B0509030403020204" pitchFamily="49" charset="0"/>
+              </a:rPr>
+              <a:t>#top</a:t>
+            </a:r>
+            <a:r>
+              <a:rPr kumimoji="0" lang="es-ES" altLang="es-ES" sz="1400" b="0" i="0" u="none" strike="noStrike" cap="none" normalizeH="0" baseline="0" dirty="0">
+                <a:ln>
+                  <a:noFill/>
+                </a:ln>
+                <a:solidFill>
+                  <a:srgbClr val="000000"/>
+                </a:solidFill>
+                <a:effectLst/>
+                <a:latin typeface="Source Code Pro" panose="020B0509030403020204" pitchFamily="49" charset="0"/>
+              </a:rPr>
+              <a:t> </a:t>
+            </a:r>
+            <a:r>
+              <a:rPr kumimoji="0" lang="es-ES" altLang="es-ES" sz="1400" b="0" i="0" u="none" strike="noStrike" cap="none" normalizeH="0" baseline="0" dirty="0">
+                <a:ln>
+                  <a:noFill/>
+                </a:ln>
+                <a:solidFill>
+                  <a:srgbClr val="999999"/>
+                </a:solidFill>
+                <a:effectLst/>
+                <a:latin typeface="Source Code Pro" panose="020B0509030403020204" pitchFamily="49" charset="0"/>
+              </a:rPr>
+              <a:t>{</a:t>
+            </a:r>
+            <a:r>
+              <a:rPr kumimoji="0" lang="es-ES" altLang="es-ES" sz="1400" b="0" i="0" u="none" strike="noStrike" cap="none" normalizeH="0" baseline="0" dirty="0">
+                <a:ln>
+                  <a:noFill/>
+                </a:ln>
+                <a:solidFill>
+                  <a:srgbClr val="000000"/>
+                </a:solidFill>
+                <a:effectLst/>
+                <a:latin typeface="Source Code Pro" panose="020B0509030403020204" pitchFamily="49" charset="0"/>
+              </a:rPr>
+              <a:t> </a:t>
+            </a:r>
+            <a:r>
+              <a:rPr kumimoji="0" lang="es-ES" altLang="es-ES" sz="1400" b="0" i="0" u="none" strike="noStrike" cap="none" normalizeH="0" baseline="0" dirty="0" err="1">
+                <a:ln>
+                  <a:noFill/>
+                </a:ln>
+                <a:solidFill>
+                  <a:srgbClr val="BB3300"/>
+                </a:solidFill>
+                <a:effectLst/>
+                <a:latin typeface="Source Code Pro" panose="020B0509030403020204" pitchFamily="49" charset="0"/>
+              </a:rPr>
+              <a:t>background</a:t>
+            </a:r>
+            <a:r>
+              <a:rPr kumimoji="0" lang="es-ES" altLang="es-ES" sz="1400" b="0" i="0" u="none" strike="noStrike" cap="none" normalizeH="0" baseline="0" dirty="0">
+                <a:ln>
+                  <a:noFill/>
+                </a:ln>
+                <a:solidFill>
+                  <a:srgbClr val="BB3300"/>
+                </a:solidFill>
+                <a:effectLst/>
+                <a:latin typeface="Source Code Pro" panose="020B0509030403020204" pitchFamily="49" charset="0"/>
+              </a:rPr>
+              <a:t>-color</a:t>
+            </a:r>
+            <a:r>
+              <a:rPr kumimoji="0" lang="es-ES" altLang="es-ES" sz="1400" b="0" i="0" u="none" strike="noStrike" cap="none" normalizeH="0" baseline="0" dirty="0">
+                <a:ln>
+                  <a:noFill/>
+                </a:ln>
+                <a:solidFill>
+                  <a:srgbClr val="999999"/>
+                </a:solidFill>
+                <a:effectLst/>
+                <a:latin typeface="Source Code Pro" panose="020B0509030403020204" pitchFamily="49" charset="0"/>
+              </a:rPr>
+              <a:t>:</a:t>
+            </a:r>
+            <a:r>
+              <a:rPr kumimoji="0" lang="es-ES" altLang="es-ES" sz="1400" b="0" i="0" u="none" strike="noStrike" cap="none" normalizeH="0" baseline="0" dirty="0">
+                <a:ln>
+                  <a:noFill/>
+                </a:ln>
+                <a:solidFill>
+                  <a:srgbClr val="000000"/>
+                </a:solidFill>
+                <a:effectLst/>
+                <a:latin typeface="Source Code Pro" panose="020B0509030403020204" pitchFamily="49" charset="0"/>
+              </a:rPr>
+              <a:t> #</a:t>
+            </a:r>
+            <a:r>
+              <a:rPr kumimoji="0" lang="es-ES" altLang="es-ES" sz="1400" b="0" i="0" u="none" strike="noStrike" cap="none" normalizeH="0" baseline="0" dirty="0" err="1">
+                <a:ln>
+                  <a:noFill/>
+                </a:ln>
+                <a:solidFill>
+                  <a:srgbClr val="000000"/>
+                </a:solidFill>
+                <a:effectLst/>
+                <a:latin typeface="Source Code Pro" panose="020B0509030403020204" pitchFamily="49" charset="0"/>
+              </a:rPr>
+              <a:t>ccc</a:t>
+            </a:r>
+            <a:r>
+              <a:rPr kumimoji="0" lang="es-ES" altLang="es-ES" sz="1400" b="0" i="0" u="none" strike="noStrike" cap="none" normalizeH="0" baseline="0" dirty="0">
+                <a:ln>
+                  <a:noFill/>
+                </a:ln>
+                <a:solidFill>
+                  <a:srgbClr val="999999"/>
+                </a:solidFill>
+                <a:effectLst/>
+                <a:latin typeface="Source Code Pro" panose="020B0509030403020204" pitchFamily="49" charset="0"/>
+              </a:rPr>
+              <a:t>;</a:t>
+            </a:r>
+            <a:r>
+              <a:rPr kumimoji="0" lang="es-ES" altLang="es-ES" sz="1400" b="0" i="0" u="none" strike="noStrike" cap="none" normalizeH="0" baseline="0" dirty="0">
+                <a:ln>
+                  <a:noFill/>
+                </a:ln>
+                <a:solidFill>
+                  <a:srgbClr val="000000"/>
+                </a:solidFill>
+                <a:effectLst/>
+                <a:latin typeface="Source Code Pro" panose="020B0509030403020204" pitchFamily="49" charset="0"/>
+              </a:rPr>
+              <a:t> </a:t>
+            </a:r>
+          </a:p>
+          <a:p>
+            <a:pPr marL="400050" lvl="1" indent="0" defTabSz="914400">
+              <a:spcBef>
+                <a:spcPct val="0"/>
+              </a:spcBef>
+              <a:buClrTx/>
+              <a:buSzTx/>
+            </a:pPr>
+            <a:r>
+              <a:rPr kumimoji="0" lang="es-ES" altLang="es-ES" sz="1400" b="0" i="0" u="none" strike="noStrike" cap="none" normalizeH="0" baseline="0" dirty="0" err="1">
+                <a:ln>
+                  <a:noFill/>
+                </a:ln>
+                <a:solidFill>
+                  <a:srgbClr val="BB3300"/>
+                </a:solidFill>
+                <a:effectLst/>
+                <a:latin typeface="Source Code Pro" panose="020B0509030403020204" pitchFamily="49" charset="0"/>
+              </a:rPr>
+              <a:t>padding</a:t>
+            </a:r>
+            <a:r>
+              <a:rPr kumimoji="0" lang="es-ES" altLang="es-ES" sz="1400" b="0" i="0" u="none" strike="noStrike" cap="none" normalizeH="0" baseline="0" dirty="0">
+                <a:ln>
+                  <a:noFill/>
+                </a:ln>
+                <a:solidFill>
+                  <a:srgbClr val="999999"/>
+                </a:solidFill>
+                <a:effectLst/>
+                <a:latin typeface="Source Code Pro" panose="020B0509030403020204" pitchFamily="49" charset="0"/>
+              </a:rPr>
+              <a:t>:</a:t>
+            </a:r>
+            <a:r>
+              <a:rPr kumimoji="0" lang="es-ES" altLang="es-ES" sz="1400" b="0" i="0" u="none" strike="noStrike" cap="none" normalizeH="0" baseline="0" dirty="0">
+                <a:ln>
+                  <a:noFill/>
+                </a:ln>
+                <a:solidFill>
+                  <a:srgbClr val="000000"/>
+                </a:solidFill>
+                <a:effectLst/>
+                <a:latin typeface="Source Code Pro" panose="020B0509030403020204" pitchFamily="49" charset="0"/>
+              </a:rPr>
+              <a:t> 20px </a:t>
+            </a:r>
+            <a:r>
+              <a:rPr kumimoji="0" lang="es-ES" altLang="es-ES" sz="1400" b="0" i="0" u="none" strike="noStrike" cap="none" normalizeH="0" baseline="0" dirty="0">
+                <a:ln>
+                  <a:noFill/>
+                </a:ln>
+                <a:solidFill>
+                  <a:srgbClr val="999999"/>
+                </a:solidFill>
+                <a:effectLst/>
+                <a:latin typeface="Source Code Pro" panose="020B0509030403020204" pitchFamily="49" charset="0"/>
+              </a:rPr>
+              <a:t>}</a:t>
+            </a:r>
+          </a:p>
+          <a:p>
+            <a:pPr marL="400050" lvl="1" indent="0" defTabSz="914400">
+              <a:spcBef>
+                <a:spcPct val="0"/>
+              </a:spcBef>
+              <a:buClrTx/>
+              <a:buSzTx/>
+            </a:pPr>
+            <a:endParaRPr kumimoji="0" lang="es-ES" altLang="es-ES" sz="1600" b="0" i="0" u="none" strike="noStrike" cap="none" normalizeH="0" baseline="0" dirty="0">
+              <a:ln>
+                <a:noFill/>
+              </a:ln>
+              <a:solidFill>
+                <a:srgbClr val="999999"/>
+              </a:solidFill>
+              <a:effectLst/>
+              <a:latin typeface="Source Code Pro" panose="020B0509030403020204" pitchFamily="49" charset="0"/>
+            </a:endParaRPr>
+          </a:p>
+          <a:p>
+            <a:pPr marL="0" marR="0" lvl="0" indent="0" algn="l" defTabSz="914400" rtl="0" eaLnBrk="0" fontAlgn="base" latinLnBrk="0" hangingPunct="0">
+              <a:lnSpc>
+                <a:spcPct val="100000"/>
+              </a:lnSpc>
+              <a:spcBef>
+                <a:spcPct val="0"/>
+              </a:spcBef>
+              <a:spcAft>
+                <a:spcPct val="0"/>
+              </a:spcAft>
+              <a:buClrTx/>
+              <a:buSzTx/>
+              <a:buFontTx/>
+              <a:buNone/>
+              <a:tabLst/>
+            </a:pPr>
+            <a:r>
+              <a:rPr kumimoji="0" lang="es-ES" altLang="es-ES" sz="1400" b="1" i="0" u="none" strike="noStrike" cap="none" normalizeH="0" baseline="0" dirty="0">
+                <a:ln>
+                  <a:noFill/>
+                </a:ln>
+                <a:solidFill>
+                  <a:srgbClr val="669900"/>
+                </a:solidFill>
+                <a:effectLst/>
+                <a:latin typeface="Source Code Pro" panose="020B0509030403020204" pitchFamily="49" charset="0"/>
+              </a:rPr>
+              <a:t>.</a:t>
+            </a:r>
+            <a:r>
+              <a:rPr kumimoji="0" lang="es-ES" altLang="es-ES" sz="1400" b="1" i="0" u="none" strike="noStrike" cap="none" normalizeH="0" baseline="0" dirty="0" err="1">
+                <a:ln>
+                  <a:noFill/>
+                </a:ln>
+                <a:solidFill>
+                  <a:srgbClr val="669900"/>
+                </a:solidFill>
+                <a:effectLst/>
+                <a:latin typeface="Source Code Pro" panose="020B0509030403020204" pitchFamily="49" charset="0"/>
+              </a:rPr>
+              <a:t>intro</a:t>
+            </a:r>
+            <a:r>
+              <a:rPr kumimoji="0" lang="es-ES" altLang="es-ES" sz="1400" b="0" i="0" u="none" strike="noStrike" cap="none" normalizeH="0" baseline="0" dirty="0">
+                <a:ln>
+                  <a:noFill/>
+                </a:ln>
+                <a:solidFill>
+                  <a:srgbClr val="000000"/>
+                </a:solidFill>
+                <a:effectLst/>
+                <a:latin typeface="Source Code Pro" panose="020B0509030403020204" pitchFamily="49" charset="0"/>
+              </a:rPr>
+              <a:t> </a:t>
+            </a:r>
+            <a:r>
+              <a:rPr kumimoji="0" lang="es-ES" altLang="es-ES" sz="1400" b="0" i="0" u="none" strike="noStrike" cap="none" normalizeH="0" baseline="0" dirty="0">
+                <a:ln>
+                  <a:noFill/>
+                </a:ln>
+                <a:solidFill>
+                  <a:srgbClr val="999999"/>
+                </a:solidFill>
+                <a:effectLst/>
+                <a:latin typeface="Source Code Pro" panose="020B0509030403020204" pitchFamily="49" charset="0"/>
+              </a:rPr>
+              <a:t>{</a:t>
+            </a:r>
+            <a:r>
+              <a:rPr kumimoji="0" lang="es-ES" altLang="es-ES" sz="1400" b="0" i="0" u="none" strike="noStrike" cap="none" normalizeH="0" baseline="0" dirty="0">
+                <a:ln>
+                  <a:noFill/>
+                </a:ln>
+                <a:solidFill>
+                  <a:srgbClr val="000000"/>
+                </a:solidFill>
+                <a:effectLst/>
+                <a:latin typeface="Source Code Pro" panose="020B0509030403020204" pitchFamily="49" charset="0"/>
+              </a:rPr>
+              <a:t> </a:t>
+            </a:r>
+            <a:r>
+              <a:rPr kumimoji="0" lang="es-ES" altLang="es-ES" sz="1400" b="0" i="0" u="none" strike="noStrike" cap="none" normalizeH="0" baseline="0" dirty="0">
+                <a:ln>
+                  <a:noFill/>
+                </a:ln>
+                <a:solidFill>
+                  <a:srgbClr val="BB3300"/>
+                </a:solidFill>
+                <a:effectLst/>
+                <a:latin typeface="Source Code Pro" panose="020B0509030403020204" pitchFamily="49" charset="0"/>
+              </a:rPr>
+              <a:t>color</a:t>
+            </a:r>
+            <a:r>
+              <a:rPr kumimoji="0" lang="es-ES" altLang="es-ES" sz="1400" b="0" i="0" u="none" strike="noStrike" cap="none" normalizeH="0" baseline="0" dirty="0">
+                <a:ln>
+                  <a:noFill/>
+                </a:ln>
+                <a:solidFill>
+                  <a:srgbClr val="999999"/>
+                </a:solidFill>
+                <a:effectLst/>
+                <a:latin typeface="Source Code Pro" panose="020B0509030403020204" pitchFamily="49" charset="0"/>
+              </a:rPr>
+              <a:t>:</a:t>
+            </a:r>
+            <a:r>
+              <a:rPr kumimoji="0" lang="es-ES" altLang="es-ES" sz="1400" b="0" i="0" u="none" strike="noStrike" cap="none" normalizeH="0" baseline="0" dirty="0">
+                <a:ln>
+                  <a:noFill/>
+                </a:ln>
+                <a:solidFill>
+                  <a:srgbClr val="000000"/>
+                </a:solidFill>
+                <a:effectLst/>
+                <a:latin typeface="Source Code Pro" panose="020B0509030403020204" pitchFamily="49" charset="0"/>
+              </a:rPr>
+              <a:t> red</a:t>
+            </a:r>
+            <a:r>
+              <a:rPr kumimoji="0" lang="es-ES" altLang="es-ES" sz="1400" b="0" i="0" u="none" strike="noStrike" cap="none" normalizeH="0" baseline="0" dirty="0">
+                <a:ln>
+                  <a:noFill/>
+                </a:ln>
+                <a:solidFill>
+                  <a:srgbClr val="999999"/>
+                </a:solidFill>
+                <a:effectLst/>
+                <a:latin typeface="Source Code Pro" panose="020B0509030403020204" pitchFamily="49" charset="0"/>
+              </a:rPr>
+              <a:t>;</a:t>
+            </a:r>
+            <a:r>
+              <a:rPr kumimoji="0" lang="es-ES" altLang="es-ES" sz="1400" b="0" i="0" u="none" strike="noStrike" cap="none" normalizeH="0" baseline="0" dirty="0">
+                <a:ln>
+                  <a:noFill/>
+                </a:ln>
+                <a:solidFill>
+                  <a:srgbClr val="000000"/>
+                </a:solidFill>
+                <a:effectLst/>
+                <a:latin typeface="Source Code Pro" panose="020B0509030403020204" pitchFamily="49" charset="0"/>
+              </a:rPr>
+              <a:t> </a:t>
+            </a:r>
+          </a:p>
+          <a:p>
+            <a:pPr marL="0" marR="0" lvl="0" indent="0" algn="l" defTabSz="914400" rtl="0" eaLnBrk="0" fontAlgn="base" latinLnBrk="0" hangingPunct="0">
+              <a:lnSpc>
+                <a:spcPct val="100000"/>
+              </a:lnSpc>
+              <a:spcBef>
+                <a:spcPct val="0"/>
+              </a:spcBef>
+              <a:spcAft>
+                <a:spcPct val="0"/>
+              </a:spcAft>
+              <a:buClrTx/>
+              <a:buSzTx/>
+              <a:buFontTx/>
+              <a:buNone/>
+              <a:tabLst/>
+            </a:pPr>
+            <a:r>
+              <a:rPr lang="es-ES" altLang="es-ES" sz="1400" dirty="0">
+                <a:latin typeface="Source Code Pro" panose="020B0509030403020204" pitchFamily="49" charset="0"/>
+              </a:rPr>
+              <a:t>	</a:t>
+            </a:r>
+            <a:r>
+              <a:rPr kumimoji="0" lang="es-ES" altLang="es-ES" sz="1400" b="0" i="0" u="none" strike="noStrike" cap="none" normalizeH="0" baseline="0" dirty="0" err="1">
+                <a:ln>
+                  <a:noFill/>
+                </a:ln>
+                <a:solidFill>
+                  <a:srgbClr val="BB3300"/>
+                </a:solidFill>
+                <a:effectLst/>
+                <a:latin typeface="Source Code Pro" panose="020B0509030403020204" pitchFamily="49" charset="0"/>
+              </a:rPr>
+              <a:t>font-weight</a:t>
+            </a:r>
+            <a:r>
+              <a:rPr kumimoji="0" lang="es-ES" altLang="es-ES" sz="1400" b="0" i="0" u="none" strike="noStrike" cap="none" normalizeH="0" baseline="0" dirty="0">
+                <a:ln>
+                  <a:noFill/>
+                </a:ln>
+                <a:solidFill>
+                  <a:srgbClr val="999999"/>
+                </a:solidFill>
+                <a:effectLst/>
+                <a:latin typeface="Source Code Pro" panose="020B0509030403020204" pitchFamily="49" charset="0"/>
+              </a:rPr>
+              <a:t>:</a:t>
+            </a:r>
+            <a:r>
+              <a:rPr kumimoji="0" lang="es-ES" altLang="es-ES" sz="1400" b="0" i="0" u="none" strike="noStrike" cap="none" normalizeH="0" baseline="0" dirty="0">
+                <a:ln>
+                  <a:noFill/>
+                </a:ln>
+                <a:solidFill>
+                  <a:srgbClr val="000000"/>
+                </a:solidFill>
+                <a:effectLst/>
+                <a:latin typeface="Source Code Pro" panose="020B0509030403020204" pitchFamily="49" charset="0"/>
+              </a:rPr>
+              <a:t> </a:t>
+            </a:r>
+            <a:r>
+              <a:rPr kumimoji="0" lang="es-ES" altLang="es-ES" sz="1400" b="0" i="0" u="none" strike="noStrike" cap="none" normalizeH="0" baseline="0" dirty="0" err="1">
+                <a:ln>
+                  <a:noFill/>
+                </a:ln>
+                <a:solidFill>
+                  <a:srgbClr val="000000"/>
+                </a:solidFill>
+                <a:effectLst/>
+                <a:latin typeface="Source Code Pro" panose="020B0509030403020204" pitchFamily="49" charset="0"/>
+              </a:rPr>
+              <a:t>bold</a:t>
+            </a:r>
+            <a:r>
+              <a:rPr kumimoji="0" lang="es-ES" altLang="es-ES" sz="1400" b="0" i="0" u="none" strike="noStrike" cap="none" normalizeH="0" baseline="0" dirty="0">
+                <a:ln>
+                  <a:noFill/>
+                </a:ln>
+                <a:solidFill>
+                  <a:srgbClr val="999999"/>
+                </a:solidFill>
+                <a:effectLst/>
+                <a:latin typeface="Source Code Pro" panose="020B0509030403020204" pitchFamily="49" charset="0"/>
+              </a:rPr>
+              <a:t>;</a:t>
+            </a:r>
+            <a:r>
+              <a:rPr kumimoji="0" lang="es-ES" altLang="es-ES" sz="1400" b="0" i="0" u="none" strike="noStrike" cap="none" normalizeH="0" baseline="0" dirty="0">
+                <a:ln>
+                  <a:noFill/>
+                </a:ln>
+                <a:solidFill>
+                  <a:srgbClr val="000000"/>
+                </a:solidFill>
+                <a:effectLst/>
+                <a:latin typeface="Source Code Pro" panose="020B0509030403020204" pitchFamily="49" charset="0"/>
+              </a:rPr>
+              <a:t> </a:t>
+            </a:r>
+            <a:r>
+              <a:rPr kumimoji="0" lang="es-ES" altLang="es-ES" sz="1400" b="0" i="0" u="none" strike="noStrike" cap="none" normalizeH="0" baseline="0" dirty="0">
+                <a:ln>
+                  <a:noFill/>
+                </a:ln>
+                <a:solidFill>
+                  <a:srgbClr val="999999"/>
+                </a:solidFill>
+                <a:effectLst/>
+                <a:latin typeface="Source Code Pro" panose="020B0509030403020204" pitchFamily="49" charset="0"/>
+              </a:rPr>
+              <a:t>}</a:t>
+            </a:r>
+            <a:r>
+              <a:rPr kumimoji="0" lang="es-ES" altLang="es-ES" sz="1400" b="0" i="0" u="none" strike="noStrike" cap="none" normalizeH="0" baseline="0" dirty="0">
+                <a:ln>
+                  <a:noFill/>
+                </a:ln>
+                <a:solidFill>
+                  <a:schemeClr val="tx1"/>
+                </a:solidFill>
+                <a:effectLst/>
+              </a:rPr>
+              <a:t> </a:t>
+            </a:r>
+            <a:endParaRPr kumimoji="0" lang="es-ES" altLang="es-ES" sz="1400" b="0" i="0" u="none" strike="noStrike" cap="none" normalizeH="0" baseline="0" dirty="0">
+              <a:ln>
+                <a:noFill/>
+              </a:ln>
+              <a:solidFill>
+                <a:schemeClr val="tx1"/>
+              </a:solidFill>
+              <a:effectLst/>
+              <a:latin typeface="Arial" panose="020B0604020202020204" pitchFamily="34" charset="0"/>
+            </a:endParaRPr>
+          </a:p>
+        </p:txBody>
+      </p:sp>
+      <p:sp>
+        <p:nvSpPr>
+          <p:cNvPr id="8" name="Rectangle 2">
+            <a:extLst>
+              <a:ext uri="{FF2B5EF4-FFF2-40B4-BE49-F238E27FC236}">
+                <a16:creationId xmlns:a16="http://schemas.microsoft.com/office/drawing/2014/main" id="{A6A95EFE-38D2-40F2-A8ED-CF091B68A212}"/>
+              </a:ext>
+            </a:extLst>
+          </p:cNvPr>
+          <p:cNvSpPr>
+            <a:spLocks noChangeArrowheads="1"/>
+          </p:cNvSpPr>
+          <p:nvPr/>
+        </p:nvSpPr>
+        <p:spPr bwMode="auto">
+          <a:xfrm>
+            <a:off x="4594649" y="3140968"/>
+            <a:ext cx="4196662" cy="1969770"/>
+          </a:xfrm>
+          <a:prstGeom prst="rect">
+            <a:avLst/>
+          </a:prstGeom>
+          <a:solidFill>
+            <a:srgbClr val="FFFFFF"/>
+          </a:solidFill>
+          <a:ln>
+            <a:noFill/>
+          </a:ln>
+          <a:effectLst/>
+          <a:extLst>
+            <a:ext uri="{91240B29-F687-4F45-9708-019B960494DF}">
+              <a14:hiddenLine xmlns:a14="http://schemas.microsoft.com/office/drawing/2010/main" w="9525">
+                <a:solidFill>
+                  <a:schemeClr val="tx1"/>
+                </a:solidFill>
+                <a:miter lim="800000"/>
+                <a:headEnd/>
+                <a:tailEnd/>
+              </a14:hiddenLine>
+            </a:ext>
+            <a:ext uri="{AF507438-7753-43E0-B8FC-AC1667EBCBE1}">
+              <a14:hiddenEffects xmlns:a14="http://schemas.microsoft.com/office/drawing/2010/main">
+                <a:effectLst>
+                  <a:outerShdw dist="35921" dir="2700000" algn="ctr" rotWithShape="0">
+                    <a:schemeClr val="bg2"/>
+                  </a:outerShdw>
+                </a:effectLst>
+              </a14:hiddenEffects>
+            </a:ext>
+          </a:extLst>
+        </p:spPr>
+        <p:txBody>
+          <a:bodyPr vert="horz" wrap="none" lIns="0" tIns="0" rIns="0" bIns="0" numCol="1" anchor="ctr" anchorCtr="0" compatLnSpc="1">
+            <a:prstTxWarp prst="textNoShape">
+              <a:avLst/>
+            </a:prstTxWarp>
+            <a:spAutoFit/>
+          </a:bodyPr>
+          <a:lstStyle/>
+          <a:p>
+            <a:pPr marL="0" marR="0" lvl="0" indent="0" algn="l" defTabSz="914400" rtl="0" eaLnBrk="0" fontAlgn="base" latinLnBrk="0" hangingPunct="0">
+              <a:lnSpc>
+                <a:spcPct val="100000"/>
+              </a:lnSpc>
+              <a:spcBef>
+                <a:spcPct val="0"/>
+              </a:spcBef>
+              <a:spcAft>
+                <a:spcPct val="0"/>
+              </a:spcAft>
+              <a:buClrTx/>
+              <a:buSzTx/>
+              <a:buFontTx/>
+              <a:buNone/>
+              <a:tabLst/>
+            </a:pPr>
+            <a:r>
+              <a:rPr kumimoji="0" lang="es-ES" altLang="es-ES" sz="1600" b="0" i="0" u="none" strike="noStrike" cap="none" normalizeH="0" baseline="0" dirty="0">
+                <a:ln>
+                  <a:noFill/>
+                </a:ln>
+                <a:solidFill>
+                  <a:srgbClr val="999999"/>
+                </a:solidFill>
+                <a:effectLst/>
+                <a:latin typeface="Source Code Pro" panose="020B0509030403020204" pitchFamily="49" charset="0"/>
+              </a:rPr>
+              <a:t>&lt;</a:t>
+            </a:r>
+            <a:r>
+              <a:rPr kumimoji="0" lang="es-ES" altLang="es-ES" sz="1600" b="0" i="0" u="none" strike="noStrike" cap="none" normalizeH="0" baseline="0" dirty="0" err="1">
+                <a:ln>
+                  <a:noFill/>
+                </a:ln>
+                <a:solidFill>
+                  <a:srgbClr val="BB3300"/>
+                </a:solidFill>
+                <a:effectLst/>
+                <a:latin typeface="Source Code Pro" panose="020B0509030403020204" pitchFamily="49" charset="0"/>
+              </a:rPr>
+              <a:t>div</a:t>
+            </a:r>
+            <a:r>
+              <a:rPr kumimoji="0" lang="es-ES" altLang="es-ES" sz="1600" b="0" i="0" u="none" strike="noStrike" cap="none" normalizeH="0" baseline="0" dirty="0">
+                <a:ln>
+                  <a:noFill/>
+                </a:ln>
+                <a:solidFill>
+                  <a:srgbClr val="BB3300"/>
+                </a:solidFill>
+                <a:effectLst/>
+                <a:latin typeface="Source Code Pro" panose="020B0509030403020204" pitchFamily="49" charset="0"/>
+              </a:rPr>
+              <a:t> </a:t>
+            </a:r>
+            <a:r>
+              <a:rPr kumimoji="0" lang="es-ES" altLang="es-ES" sz="1600" b="1" i="0" u="none" strike="noStrike" cap="none" normalizeH="0" baseline="0" dirty="0">
+                <a:ln>
+                  <a:noFill/>
+                </a:ln>
+                <a:solidFill>
+                  <a:srgbClr val="669900"/>
+                </a:solidFill>
+                <a:effectLst/>
+                <a:latin typeface="Source Code Pro" panose="020B0509030403020204" pitchFamily="49" charset="0"/>
+              </a:rPr>
+              <a:t>id</a:t>
+            </a:r>
+            <a:r>
+              <a:rPr kumimoji="0" lang="es-ES" altLang="es-ES" sz="1600" b="1" i="0" u="none" strike="noStrike" cap="none" normalizeH="0" baseline="0" dirty="0">
+                <a:ln>
+                  <a:noFill/>
+                </a:ln>
+                <a:solidFill>
+                  <a:srgbClr val="999999"/>
+                </a:solidFill>
+                <a:effectLst/>
+                <a:latin typeface="Source Code Pro" panose="020B0509030403020204" pitchFamily="49" charset="0"/>
+              </a:rPr>
+              <a:t>="</a:t>
+            </a:r>
+            <a:r>
+              <a:rPr kumimoji="0" lang="es-ES" altLang="es-ES" sz="1600" b="1" i="0" u="none" strike="noStrike" cap="none" normalizeH="0" baseline="0" dirty="0">
+                <a:ln>
+                  <a:noFill/>
+                </a:ln>
+                <a:solidFill>
+                  <a:srgbClr val="0077AA"/>
+                </a:solidFill>
+                <a:effectLst/>
+                <a:latin typeface="Source Code Pro" panose="020B0509030403020204" pitchFamily="49" charset="0"/>
+              </a:rPr>
+              <a:t>top</a:t>
+            </a:r>
+            <a:r>
+              <a:rPr kumimoji="0" lang="es-ES" altLang="es-ES" sz="1600" b="1" i="0" u="none" strike="noStrike" cap="none" normalizeH="0" baseline="0" dirty="0">
+                <a:ln>
+                  <a:noFill/>
+                </a:ln>
+                <a:solidFill>
+                  <a:srgbClr val="999999"/>
+                </a:solidFill>
+                <a:effectLst/>
+                <a:latin typeface="Source Code Pro" panose="020B0509030403020204" pitchFamily="49" charset="0"/>
+              </a:rPr>
+              <a:t>"</a:t>
+            </a:r>
+            <a:r>
+              <a:rPr kumimoji="0" lang="es-ES" altLang="es-ES" sz="1600" b="0" i="0" u="none" strike="noStrike" cap="none" normalizeH="0" baseline="0" dirty="0">
+                <a:ln>
+                  <a:noFill/>
+                </a:ln>
+                <a:solidFill>
+                  <a:srgbClr val="999999"/>
+                </a:solidFill>
+                <a:effectLst/>
+                <a:latin typeface="Source Code Pro" panose="020B0509030403020204" pitchFamily="49" charset="0"/>
+              </a:rPr>
+              <a:t>&gt;</a:t>
+            </a:r>
+            <a:r>
+              <a:rPr kumimoji="0" lang="es-ES" altLang="es-ES" sz="1600" b="0" i="0" u="none" strike="noStrike" cap="none" normalizeH="0" baseline="0" dirty="0">
+                <a:ln>
+                  <a:noFill/>
+                </a:ln>
+                <a:solidFill>
+                  <a:srgbClr val="000000"/>
+                </a:solidFill>
+                <a:effectLst/>
+                <a:latin typeface="Source Code Pro" panose="020B0509030403020204" pitchFamily="49" charset="0"/>
+              </a:rPr>
+              <a:t> </a:t>
+            </a:r>
+          </a:p>
+          <a:p>
+            <a:pPr marL="0" marR="0" lvl="0" indent="0" algn="l" defTabSz="914400" rtl="0" eaLnBrk="0" fontAlgn="base" latinLnBrk="0" hangingPunct="0">
+              <a:lnSpc>
+                <a:spcPct val="100000"/>
+              </a:lnSpc>
+              <a:spcBef>
+                <a:spcPct val="0"/>
+              </a:spcBef>
+              <a:spcAft>
+                <a:spcPct val="0"/>
+              </a:spcAft>
+              <a:buClrTx/>
+              <a:buSzTx/>
+              <a:buFontTx/>
+              <a:buNone/>
+              <a:tabLst/>
+            </a:pPr>
+            <a:r>
+              <a:rPr kumimoji="0" lang="es-ES" altLang="es-ES" sz="1600" b="0" i="0" u="none" strike="noStrike" cap="none" normalizeH="0" baseline="0" dirty="0">
+                <a:ln>
+                  <a:noFill/>
+                </a:ln>
+                <a:solidFill>
+                  <a:srgbClr val="999999"/>
+                </a:solidFill>
+                <a:effectLst/>
+                <a:latin typeface="Source Code Pro" panose="020B0509030403020204" pitchFamily="49" charset="0"/>
+              </a:rPr>
+              <a:t>&lt;</a:t>
+            </a:r>
+            <a:r>
+              <a:rPr kumimoji="0" lang="es-ES" altLang="es-ES" sz="1600" b="0" i="0" u="none" strike="noStrike" cap="none" normalizeH="0" baseline="0" dirty="0">
+                <a:ln>
+                  <a:noFill/>
+                </a:ln>
+                <a:solidFill>
+                  <a:srgbClr val="BB3300"/>
+                </a:solidFill>
+                <a:effectLst/>
+                <a:latin typeface="Source Code Pro" panose="020B0509030403020204" pitchFamily="49" charset="0"/>
+              </a:rPr>
+              <a:t>h1</a:t>
+            </a:r>
+            <a:r>
+              <a:rPr kumimoji="0" lang="es-ES" altLang="es-ES" sz="1600" b="0" i="0" u="none" strike="noStrike" cap="none" normalizeH="0" baseline="0" dirty="0">
+                <a:ln>
+                  <a:noFill/>
+                </a:ln>
+                <a:solidFill>
+                  <a:srgbClr val="999999"/>
+                </a:solidFill>
+                <a:effectLst/>
+                <a:latin typeface="Source Code Pro" panose="020B0509030403020204" pitchFamily="49" charset="0"/>
+              </a:rPr>
+              <a:t>&gt;</a:t>
+            </a:r>
+            <a:r>
+              <a:rPr kumimoji="0" lang="es-ES" altLang="es-ES" sz="1600" b="0" i="0" u="none" strike="noStrike" cap="none" normalizeH="0" baseline="0" dirty="0">
+                <a:ln>
+                  <a:noFill/>
+                </a:ln>
+                <a:solidFill>
+                  <a:srgbClr val="000000"/>
+                </a:solidFill>
+                <a:effectLst/>
+                <a:latin typeface="Source Code Pro" panose="020B0509030403020204" pitchFamily="49" charset="0"/>
+              </a:rPr>
+              <a:t>Chocolate curry</a:t>
+            </a:r>
+            <a:r>
+              <a:rPr kumimoji="0" lang="es-ES" altLang="es-ES" sz="1600" b="0" i="0" u="none" strike="noStrike" cap="none" normalizeH="0" baseline="0" dirty="0">
+                <a:ln>
+                  <a:noFill/>
+                </a:ln>
+                <a:solidFill>
+                  <a:srgbClr val="999999"/>
+                </a:solidFill>
+                <a:effectLst/>
+                <a:latin typeface="Source Code Pro" panose="020B0509030403020204" pitchFamily="49" charset="0"/>
+              </a:rPr>
+              <a:t>&lt;/</a:t>
+            </a:r>
+            <a:r>
+              <a:rPr kumimoji="0" lang="es-ES" altLang="es-ES" sz="1600" b="0" i="0" u="none" strike="noStrike" cap="none" normalizeH="0" baseline="0" dirty="0">
+                <a:ln>
+                  <a:noFill/>
+                </a:ln>
+                <a:solidFill>
+                  <a:srgbClr val="BB3300"/>
+                </a:solidFill>
+                <a:effectLst/>
+                <a:latin typeface="Source Code Pro" panose="020B0509030403020204" pitchFamily="49" charset="0"/>
+              </a:rPr>
+              <a:t>h1</a:t>
+            </a:r>
+            <a:r>
+              <a:rPr kumimoji="0" lang="es-ES" altLang="es-ES" sz="1600" b="0" i="0" u="none" strike="noStrike" cap="none" normalizeH="0" baseline="0" dirty="0">
+                <a:ln>
+                  <a:noFill/>
+                </a:ln>
+                <a:solidFill>
+                  <a:srgbClr val="999999"/>
+                </a:solidFill>
+                <a:effectLst/>
+                <a:latin typeface="Source Code Pro" panose="020B0509030403020204" pitchFamily="49" charset="0"/>
+              </a:rPr>
+              <a:t>&gt;</a:t>
+            </a:r>
+            <a:r>
+              <a:rPr kumimoji="0" lang="es-ES" altLang="es-ES" sz="1600" b="0" i="0" u="none" strike="noStrike" cap="none" normalizeH="0" baseline="0" dirty="0">
+                <a:ln>
+                  <a:noFill/>
+                </a:ln>
+                <a:solidFill>
+                  <a:srgbClr val="000000"/>
+                </a:solidFill>
+                <a:effectLst/>
+                <a:latin typeface="Source Code Pro" panose="020B0509030403020204" pitchFamily="49" charset="0"/>
+              </a:rPr>
+              <a:t> </a:t>
+            </a:r>
+          </a:p>
+          <a:p>
+            <a:pPr marL="0" marR="0" lvl="0" indent="0" algn="l" defTabSz="914400" rtl="0" eaLnBrk="0" fontAlgn="base" latinLnBrk="0" hangingPunct="0">
+              <a:lnSpc>
+                <a:spcPct val="100000"/>
+              </a:lnSpc>
+              <a:spcBef>
+                <a:spcPct val="0"/>
+              </a:spcBef>
+              <a:spcAft>
+                <a:spcPct val="0"/>
+              </a:spcAft>
+              <a:buClrTx/>
+              <a:buSzTx/>
+              <a:buFontTx/>
+              <a:buNone/>
+              <a:tabLst/>
+            </a:pPr>
+            <a:r>
+              <a:rPr kumimoji="0" lang="es-ES" altLang="es-ES" sz="1600" b="0" i="0" u="none" strike="noStrike" cap="none" normalizeH="0" baseline="0" dirty="0">
+                <a:ln>
+                  <a:noFill/>
+                </a:ln>
+                <a:solidFill>
+                  <a:srgbClr val="999999"/>
+                </a:solidFill>
+                <a:effectLst/>
+                <a:latin typeface="Source Code Pro" panose="020B0509030403020204" pitchFamily="49" charset="0"/>
+              </a:rPr>
+              <a:t>&lt;</a:t>
+            </a:r>
+            <a:r>
+              <a:rPr kumimoji="0" lang="es-ES" altLang="es-ES" sz="1600" b="0" i="0" u="none" strike="noStrike" cap="none" normalizeH="0" baseline="0" dirty="0">
+                <a:ln>
+                  <a:noFill/>
+                </a:ln>
+                <a:solidFill>
+                  <a:srgbClr val="BB3300"/>
+                </a:solidFill>
+                <a:effectLst/>
+                <a:latin typeface="Source Code Pro" panose="020B0509030403020204" pitchFamily="49" charset="0"/>
+              </a:rPr>
+              <a:t>p </a:t>
+            </a:r>
+            <a:r>
+              <a:rPr kumimoji="0" lang="es-ES" altLang="es-ES" sz="1600" b="1" i="0" u="none" strike="noStrike" cap="none" normalizeH="0" baseline="0" dirty="0" err="1">
+                <a:ln>
+                  <a:noFill/>
+                </a:ln>
+                <a:solidFill>
+                  <a:srgbClr val="669900"/>
+                </a:solidFill>
+                <a:effectLst/>
+                <a:latin typeface="Source Code Pro" panose="020B0509030403020204" pitchFamily="49" charset="0"/>
+              </a:rPr>
+              <a:t>class</a:t>
+            </a:r>
+            <a:r>
+              <a:rPr kumimoji="0" lang="es-ES" altLang="es-ES" sz="1600" b="1" i="0" u="none" strike="noStrike" cap="none" normalizeH="0" baseline="0" dirty="0">
+                <a:ln>
+                  <a:noFill/>
+                </a:ln>
+                <a:solidFill>
+                  <a:srgbClr val="999999"/>
+                </a:solidFill>
+                <a:effectLst/>
+                <a:latin typeface="Source Code Pro" panose="020B0509030403020204" pitchFamily="49" charset="0"/>
+              </a:rPr>
+              <a:t>="</a:t>
+            </a:r>
+            <a:r>
+              <a:rPr kumimoji="0" lang="es-ES" altLang="es-ES" sz="1600" b="1" i="0" u="none" strike="noStrike" cap="none" normalizeH="0" baseline="0" dirty="0" err="1">
+                <a:ln>
+                  <a:noFill/>
+                </a:ln>
+                <a:solidFill>
+                  <a:srgbClr val="0077AA"/>
+                </a:solidFill>
+                <a:effectLst/>
+                <a:latin typeface="Source Code Pro" panose="020B0509030403020204" pitchFamily="49" charset="0"/>
+              </a:rPr>
+              <a:t>intro</a:t>
+            </a:r>
+            <a:r>
+              <a:rPr kumimoji="0" lang="es-ES" altLang="es-ES" sz="1600" b="1" i="0" u="none" strike="noStrike" cap="none" normalizeH="0" baseline="0" dirty="0">
+                <a:ln>
+                  <a:noFill/>
+                </a:ln>
+                <a:solidFill>
+                  <a:srgbClr val="999999"/>
+                </a:solidFill>
+                <a:effectLst/>
+                <a:latin typeface="Source Code Pro" panose="020B0509030403020204" pitchFamily="49" charset="0"/>
+              </a:rPr>
+              <a:t>"</a:t>
+            </a:r>
+            <a:r>
+              <a:rPr kumimoji="0" lang="es-ES" altLang="es-ES" sz="1600" b="0" i="0" u="none" strike="noStrike" cap="none" normalizeH="0" baseline="0" dirty="0">
+                <a:ln>
+                  <a:noFill/>
+                </a:ln>
+                <a:solidFill>
+                  <a:srgbClr val="999999"/>
+                </a:solidFill>
+                <a:effectLst/>
+                <a:latin typeface="Source Code Pro" panose="020B0509030403020204" pitchFamily="49" charset="0"/>
+              </a:rPr>
+              <a:t>&gt;</a:t>
+            </a:r>
+          </a:p>
+          <a:p>
+            <a:pPr marL="0" marR="0" lvl="0" indent="0" algn="l" defTabSz="914400" rtl="0" eaLnBrk="0" fontAlgn="base" latinLnBrk="0" hangingPunct="0">
+              <a:lnSpc>
+                <a:spcPct val="100000"/>
+              </a:lnSpc>
+              <a:spcBef>
+                <a:spcPct val="0"/>
+              </a:spcBef>
+              <a:spcAft>
+                <a:spcPct val="0"/>
+              </a:spcAft>
+              <a:buClrTx/>
+              <a:buSzTx/>
+              <a:buFontTx/>
+              <a:buNone/>
+              <a:tabLst/>
+            </a:pPr>
+            <a:r>
+              <a:rPr kumimoji="0" lang="es-ES" altLang="es-ES" sz="1600" b="0" i="0" u="none" strike="noStrike" cap="none" normalizeH="0" baseline="0" dirty="0" err="1">
+                <a:ln>
+                  <a:noFill/>
+                </a:ln>
+                <a:solidFill>
+                  <a:srgbClr val="000000"/>
+                </a:solidFill>
+                <a:effectLst/>
+                <a:latin typeface="Source Code Pro" panose="020B0509030403020204" pitchFamily="49" charset="0"/>
+              </a:rPr>
+              <a:t>This</a:t>
+            </a:r>
+            <a:r>
+              <a:rPr kumimoji="0" lang="es-ES" altLang="es-ES" sz="1600" b="0" i="0" u="none" strike="noStrike" cap="none" normalizeH="0" baseline="0" dirty="0">
+                <a:ln>
+                  <a:noFill/>
+                </a:ln>
+                <a:solidFill>
+                  <a:srgbClr val="000000"/>
+                </a:solidFill>
+                <a:effectLst/>
+                <a:latin typeface="Source Code Pro" panose="020B0509030403020204" pitchFamily="49" charset="0"/>
+              </a:rPr>
+              <a:t> </a:t>
+            </a:r>
+            <a:r>
+              <a:rPr kumimoji="0" lang="es-ES" altLang="es-ES" sz="1600" b="0" i="0" u="none" strike="noStrike" cap="none" normalizeH="0" baseline="0" dirty="0" err="1">
+                <a:ln>
+                  <a:noFill/>
+                </a:ln>
+                <a:solidFill>
+                  <a:srgbClr val="000000"/>
+                </a:solidFill>
+                <a:effectLst/>
+                <a:latin typeface="Source Code Pro" panose="020B0509030403020204" pitchFamily="49" charset="0"/>
+              </a:rPr>
+              <a:t>is</a:t>
+            </a:r>
+            <a:r>
+              <a:rPr kumimoji="0" lang="es-ES" altLang="es-ES" sz="1600" b="0" i="0" u="none" strike="noStrike" cap="none" normalizeH="0" baseline="0" dirty="0">
+                <a:ln>
+                  <a:noFill/>
+                </a:ln>
+                <a:solidFill>
+                  <a:srgbClr val="000000"/>
+                </a:solidFill>
+                <a:effectLst/>
+                <a:latin typeface="Source Code Pro" panose="020B0509030403020204" pitchFamily="49" charset="0"/>
+              </a:rPr>
+              <a:t> </a:t>
+            </a:r>
+            <a:r>
+              <a:rPr kumimoji="0" lang="es-ES" altLang="es-ES" sz="1600" b="0" i="0" u="none" strike="noStrike" cap="none" normalizeH="0" baseline="0" dirty="0" err="1">
+                <a:ln>
+                  <a:noFill/>
+                </a:ln>
+                <a:solidFill>
+                  <a:srgbClr val="000000"/>
+                </a:solidFill>
+                <a:effectLst/>
+                <a:latin typeface="Source Code Pro" panose="020B0509030403020204" pitchFamily="49" charset="0"/>
+              </a:rPr>
+              <a:t>my</a:t>
+            </a:r>
+            <a:r>
+              <a:rPr kumimoji="0" lang="es-ES" altLang="es-ES" sz="1600" b="0" i="0" u="none" strike="noStrike" cap="none" normalizeH="0" baseline="0" dirty="0">
+                <a:ln>
+                  <a:noFill/>
+                </a:ln>
+                <a:solidFill>
+                  <a:srgbClr val="000000"/>
+                </a:solidFill>
+                <a:effectLst/>
+                <a:latin typeface="Source Code Pro" panose="020B0509030403020204" pitchFamily="49" charset="0"/>
+              </a:rPr>
+              <a:t> </a:t>
+            </a:r>
+            <a:r>
+              <a:rPr kumimoji="0" lang="es-ES" altLang="es-ES" sz="1600" b="0" i="0" u="none" strike="noStrike" cap="none" normalizeH="0" baseline="0" dirty="0" err="1">
+                <a:ln>
+                  <a:noFill/>
+                </a:ln>
+                <a:solidFill>
+                  <a:srgbClr val="000000"/>
+                </a:solidFill>
+                <a:effectLst/>
+                <a:latin typeface="Source Code Pro" panose="020B0509030403020204" pitchFamily="49" charset="0"/>
+              </a:rPr>
+              <a:t>recipe</a:t>
+            </a:r>
+            <a:r>
+              <a:rPr kumimoji="0" lang="es-ES" altLang="es-ES" sz="1600" b="0" i="0" u="none" strike="noStrike" cap="none" normalizeH="0" baseline="0" dirty="0">
+                <a:ln>
+                  <a:noFill/>
+                </a:ln>
+                <a:solidFill>
+                  <a:srgbClr val="000000"/>
+                </a:solidFill>
+                <a:effectLst/>
+                <a:latin typeface="Source Code Pro" panose="020B0509030403020204" pitchFamily="49" charset="0"/>
+              </a:rPr>
+              <a:t> </a:t>
+            </a:r>
+            <a:r>
+              <a:rPr kumimoji="0" lang="es-ES" altLang="es-ES" sz="1600" b="0" i="0" u="none" strike="noStrike" cap="none" normalizeH="0" baseline="0" dirty="0" err="1">
+                <a:ln>
+                  <a:noFill/>
+                </a:ln>
+                <a:solidFill>
+                  <a:srgbClr val="000000"/>
+                </a:solidFill>
+                <a:effectLst/>
+                <a:latin typeface="Source Code Pro" panose="020B0509030403020204" pitchFamily="49" charset="0"/>
+              </a:rPr>
+              <a:t>for</a:t>
+            </a:r>
+            <a:endParaRPr kumimoji="0" lang="es-ES" altLang="es-ES" sz="1600" b="0" i="0" u="none" strike="noStrike" cap="none" normalizeH="0" baseline="0" dirty="0">
+              <a:ln>
+                <a:noFill/>
+              </a:ln>
+              <a:solidFill>
+                <a:srgbClr val="000000"/>
+              </a:solidFill>
+              <a:effectLst/>
+              <a:latin typeface="Source Code Pro" panose="020B0509030403020204" pitchFamily="49" charset="0"/>
+            </a:endParaRPr>
+          </a:p>
+          <a:p>
+            <a:pPr marL="0" marR="0" lvl="0" indent="0" algn="l" defTabSz="914400" rtl="0" eaLnBrk="0" fontAlgn="base" latinLnBrk="0" hangingPunct="0">
+              <a:lnSpc>
+                <a:spcPct val="100000"/>
+              </a:lnSpc>
+              <a:spcBef>
+                <a:spcPct val="0"/>
+              </a:spcBef>
+              <a:spcAft>
+                <a:spcPct val="0"/>
+              </a:spcAft>
+              <a:buClrTx/>
+              <a:buSzTx/>
+              <a:buFontTx/>
+              <a:buNone/>
+              <a:tabLst/>
+            </a:pPr>
+            <a:r>
+              <a:rPr kumimoji="0" lang="es-ES" altLang="es-ES" sz="1600" b="0" i="0" u="none" strike="noStrike" cap="none" normalizeH="0" baseline="0" dirty="0">
+                <a:ln>
+                  <a:noFill/>
+                </a:ln>
+                <a:solidFill>
+                  <a:srgbClr val="000000"/>
+                </a:solidFill>
+                <a:effectLst/>
+                <a:latin typeface="Source Code Pro" panose="020B0509030403020204" pitchFamily="49" charset="0"/>
+              </a:rPr>
+              <a:t> </a:t>
+            </a:r>
+            <a:r>
+              <a:rPr kumimoji="0" lang="es-ES" altLang="es-ES" sz="1600" b="0" i="0" u="none" strike="noStrike" cap="none" normalizeH="0" baseline="0" dirty="0" err="1">
+                <a:ln>
+                  <a:noFill/>
+                </a:ln>
+                <a:solidFill>
+                  <a:srgbClr val="000000"/>
+                </a:solidFill>
+                <a:effectLst/>
+                <a:latin typeface="Source Code Pro" panose="020B0509030403020204" pitchFamily="49" charset="0"/>
+              </a:rPr>
+              <a:t>making</a:t>
+            </a:r>
+            <a:r>
+              <a:rPr kumimoji="0" lang="es-ES" altLang="es-ES" sz="1600" b="0" i="0" u="none" strike="noStrike" cap="none" normalizeH="0" baseline="0" dirty="0">
+                <a:ln>
+                  <a:noFill/>
+                </a:ln>
+                <a:solidFill>
+                  <a:srgbClr val="000000"/>
+                </a:solidFill>
+                <a:effectLst/>
+                <a:latin typeface="Source Code Pro" panose="020B0509030403020204" pitchFamily="49" charset="0"/>
+              </a:rPr>
+              <a:t> curry </a:t>
+            </a:r>
+            <a:r>
+              <a:rPr kumimoji="0" lang="es-ES" altLang="es-ES" sz="1600" b="0" i="0" u="none" strike="noStrike" cap="none" normalizeH="0" baseline="0" dirty="0" err="1">
+                <a:ln>
+                  <a:noFill/>
+                </a:ln>
+                <a:solidFill>
+                  <a:srgbClr val="000000"/>
+                </a:solidFill>
+                <a:effectLst/>
+                <a:latin typeface="Source Code Pro" panose="020B0509030403020204" pitchFamily="49" charset="0"/>
+              </a:rPr>
+              <a:t>purely</a:t>
+            </a:r>
+            <a:r>
+              <a:rPr kumimoji="0" lang="es-ES" altLang="es-ES" sz="1600" b="0" i="0" u="none" strike="noStrike" cap="none" normalizeH="0" baseline="0" dirty="0">
+                <a:ln>
+                  <a:noFill/>
+                </a:ln>
+                <a:solidFill>
+                  <a:srgbClr val="000000"/>
+                </a:solidFill>
+                <a:effectLst/>
+                <a:latin typeface="Source Code Pro" panose="020B0509030403020204" pitchFamily="49" charset="0"/>
+              </a:rPr>
+              <a:t> </a:t>
+            </a:r>
+          </a:p>
+          <a:p>
+            <a:pPr marL="0" marR="0" lvl="0" indent="0" algn="l" defTabSz="914400" rtl="0" eaLnBrk="0" fontAlgn="base" latinLnBrk="0" hangingPunct="0">
+              <a:lnSpc>
+                <a:spcPct val="100000"/>
+              </a:lnSpc>
+              <a:spcBef>
+                <a:spcPct val="0"/>
+              </a:spcBef>
+              <a:spcAft>
+                <a:spcPct val="0"/>
+              </a:spcAft>
+              <a:buClrTx/>
+              <a:buSzTx/>
+              <a:buFontTx/>
+              <a:buNone/>
+              <a:tabLst/>
+            </a:pPr>
+            <a:r>
+              <a:rPr kumimoji="0" lang="es-ES" altLang="es-ES" sz="1600" b="0" i="0" u="none" strike="noStrike" cap="none" normalizeH="0" baseline="0" dirty="0" err="1">
+                <a:ln>
+                  <a:noFill/>
+                </a:ln>
+                <a:solidFill>
+                  <a:srgbClr val="000000"/>
+                </a:solidFill>
+                <a:effectLst/>
+                <a:latin typeface="Source Code Pro" panose="020B0509030403020204" pitchFamily="49" charset="0"/>
+              </a:rPr>
+              <a:t>with</a:t>
+            </a:r>
+            <a:r>
+              <a:rPr kumimoji="0" lang="es-ES" altLang="es-ES" sz="1600" b="0" i="0" u="none" strike="noStrike" cap="none" normalizeH="0" baseline="0" dirty="0">
+                <a:ln>
+                  <a:noFill/>
+                </a:ln>
+                <a:solidFill>
+                  <a:srgbClr val="000000"/>
+                </a:solidFill>
+                <a:effectLst/>
+                <a:latin typeface="Source Code Pro" panose="020B0509030403020204" pitchFamily="49" charset="0"/>
+              </a:rPr>
+              <a:t> chocolate</a:t>
+            </a:r>
+            <a:r>
+              <a:rPr kumimoji="0" lang="es-ES" altLang="es-ES" sz="1600" b="0" i="0" u="none" strike="noStrike" cap="none" normalizeH="0" baseline="0" dirty="0">
+                <a:ln>
+                  <a:noFill/>
+                </a:ln>
+                <a:solidFill>
+                  <a:srgbClr val="999999"/>
+                </a:solidFill>
+                <a:effectLst/>
+                <a:latin typeface="Source Code Pro" panose="020B0509030403020204" pitchFamily="49" charset="0"/>
+              </a:rPr>
+              <a:t>&lt;/</a:t>
+            </a:r>
+            <a:r>
+              <a:rPr kumimoji="0" lang="es-ES" altLang="es-ES" sz="1600" b="0" i="0" u="none" strike="noStrike" cap="none" normalizeH="0" baseline="0" dirty="0">
+                <a:ln>
+                  <a:noFill/>
+                </a:ln>
+                <a:solidFill>
+                  <a:srgbClr val="BB3300"/>
+                </a:solidFill>
+                <a:effectLst/>
+                <a:latin typeface="Source Code Pro" panose="020B0509030403020204" pitchFamily="49" charset="0"/>
+              </a:rPr>
+              <a:t>p</a:t>
+            </a:r>
+            <a:r>
+              <a:rPr kumimoji="0" lang="es-ES" altLang="es-ES" sz="1600" b="0" i="0" u="none" strike="noStrike" cap="none" normalizeH="0" baseline="0" dirty="0">
+                <a:ln>
+                  <a:noFill/>
+                </a:ln>
+                <a:solidFill>
+                  <a:srgbClr val="999999"/>
+                </a:solidFill>
+                <a:effectLst/>
+                <a:latin typeface="Source Code Pro" panose="020B0509030403020204" pitchFamily="49" charset="0"/>
+              </a:rPr>
+              <a:t>&gt;</a:t>
+            </a:r>
+            <a:r>
+              <a:rPr kumimoji="0" lang="es-ES" altLang="es-ES" sz="1600" b="0" i="0" u="none" strike="noStrike" cap="none" normalizeH="0" baseline="0" dirty="0">
+                <a:ln>
+                  <a:noFill/>
+                </a:ln>
+                <a:solidFill>
+                  <a:srgbClr val="000000"/>
+                </a:solidFill>
+                <a:effectLst/>
+                <a:latin typeface="Source Code Pro" panose="020B0509030403020204" pitchFamily="49" charset="0"/>
+              </a:rPr>
+              <a:t> </a:t>
+            </a:r>
+          </a:p>
+          <a:p>
+            <a:pPr marL="0" marR="0" lvl="0" indent="0" algn="l" defTabSz="914400" rtl="0" eaLnBrk="0" fontAlgn="base" latinLnBrk="0" hangingPunct="0">
+              <a:lnSpc>
+                <a:spcPct val="100000"/>
+              </a:lnSpc>
+              <a:spcBef>
+                <a:spcPct val="0"/>
+              </a:spcBef>
+              <a:spcAft>
+                <a:spcPct val="0"/>
+              </a:spcAft>
+              <a:buClrTx/>
+              <a:buSzTx/>
+              <a:buFontTx/>
+              <a:buNone/>
+              <a:tabLst/>
+            </a:pPr>
+            <a:r>
+              <a:rPr kumimoji="0" lang="es-ES" altLang="es-ES" sz="1600" b="0" i="0" u="none" strike="noStrike" cap="none" normalizeH="0" baseline="0" dirty="0">
+                <a:ln>
+                  <a:noFill/>
+                </a:ln>
+                <a:solidFill>
+                  <a:srgbClr val="999999"/>
+                </a:solidFill>
+                <a:effectLst/>
+                <a:latin typeface="Source Code Pro" panose="020B0509030403020204" pitchFamily="49" charset="0"/>
+              </a:rPr>
+              <a:t>&lt;</a:t>
+            </a:r>
+            <a:r>
+              <a:rPr kumimoji="0" lang="es-ES" altLang="es-ES" sz="1600" b="0" i="0" u="none" strike="noStrike" cap="none" normalizeH="0" baseline="0" dirty="0">
+                <a:ln>
+                  <a:noFill/>
+                </a:ln>
+                <a:solidFill>
+                  <a:srgbClr val="BB3300"/>
+                </a:solidFill>
+                <a:effectLst/>
+                <a:latin typeface="Source Code Pro" panose="020B0509030403020204" pitchFamily="49" charset="0"/>
+              </a:rPr>
+              <a:t>p </a:t>
+            </a:r>
+            <a:r>
+              <a:rPr kumimoji="0" lang="es-ES" altLang="es-ES" sz="1600" b="1" i="0" u="none" strike="noStrike" cap="none" normalizeH="0" baseline="0" dirty="0" err="1">
+                <a:ln>
+                  <a:noFill/>
+                </a:ln>
+                <a:solidFill>
+                  <a:srgbClr val="669900"/>
+                </a:solidFill>
+                <a:effectLst/>
+                <a:latin typeface="Source Code Pro" panose="020B0509030403020204" pitchFamily="49" charset="0"/>
+              </a:rPr>
+              <a:t>class</a:t>
+            </a:r>
+            <a:r>
+              <a:rPr kumimoji="0" lang="es-ES" altLang="es-ES" sz="1600" b="1" i="0" u="none" strike="noStrike" cap="none" normalizeH="0" baseline="0" dirty="0">
+                <a:ln>
+                  <a:noFill/>
+                </a:ln>
+                <a:solidFill>
+                  <a:srgbClr val="999999"/>
+                </a:solidFill>
+                <a:effectLst/>
+                <a:latin typeface="Source Code Pro" panose="020B0509030403020204" pitchFamily="49" charset="0"/>
+              </a:rPr>
+              <a:t>="</a:t>
+            </a:r>
+            <a:r>
+              <a:rPr kumimoji="0" lang="es-ES" altLang="es-ES" sz="1600" b="1" i="0" u="none" strike="noStrike" cap="none" normalizeH="0" baseline="0" dirty="0" err="1">
+                <a:ln>
+                  <a:noFill/>
+                </a:ln>
+                <a:solidFill>
+                  <a:srgbClr val="0077AA"/>
+                </a:solidFill>
+                <a:effectLst/>
+                <a:latin typeface="Source Code Pro" panose="020B0509030403020204" pitchFamily="49" charset="0"/>
+              </a:rPr>
+              <a:t>intro</a:t>
+            </a:r>
+            <a:r>
+              <a:rPr kumimoji="0" lang="es-ES" altLang="es-ES" sz="1600" b="1" i="0" u="none" strike="noStrike" cap="none" normalizeH="0" baseline="0" dirty="0">
+                <a:ln>
+                  <a:noFill/>
+                </a:ln>
+                <a:solidFill>
+                  <a:srgbClr val="999999"/>
+                </a:solidFill>
+                <a:effectLst/>
+                <a:latin typeface="Source Code Pro" panose="020B0509030403020204" pitchFamily="49" charset="0"/>
+              </a:rPr>
+              <a:t>"</a:t>
+            </a:r>
+            <a:r>
+              <a:rPr kumimoji="0" lang="es-ES" altLang="es-ES" sz="1600" b="0" i="0" u="none" strike="noStrike" cap="none" normalizeH="0" baseline="0" dirty="0">
+                <a:ln>
+                  <a:noFill/>
+                </a:ln>
+                <a:solidFill>
+                  <a:srgbClr val="999999"/>
+                </a:solidFill>
+                <a:effectLst/>
+                <a:latin typeface="Source Code Pro" panose="020B0509030403020204" pitchFamily="49" charset="0"/>
+              </a:rPr>
+              <a:t>&gt;</a:t>
+            </a:r>
+            <a:r>
+              <a:rPr kumimoji="0" lang="es-ES" altLang="es-ES" sz="1600" b="0" i="0" u="none" strike="noStrike" cap="none" normalizeH="0" baseline="0" dirty="0" err="1">
+                <a:ln>
+                  <a:noFill/>
+                </a:ln>
+                <a:solidFill>
+                  <a:srgbClr val="000000"/>
+                </a:solidFill>
+                <a:effectLst/>
+                <a:latin typeface="Source Code Pro" panose="020B0509030403020204" pitchFamily="49" charset="0"/>
+              </a:rPr>
+              <a:t>Mmm</a:t>
+            </a:r>
+            <a:r>
+              <a:rPr kumimoji="0" lang="es-ES" altLang="es-ES" sz="1600" b="0" i="0" u="none" strike="noStrike" cap="none" normalizeH="0" baseline="0" dirty="0">
+                <a:ln>
+                  <a:noFill/>
+                </a:ln>
+                <a:solidFill>
+                  <a:srgbClr val="000000"/>
+                </a:solidFill>
+                <a:effectLst/>
+                <a:latin typeface="Source Code Pro" panose="020B0509030403020204" pitchFamily="49" charset="0"/>
+              </a:rPr>
+              <a:t> mm </a:t>
+            </a:r>
+            <a:r>
+              <a:rPr kumimoji="0" lang="es-ES" altLang="es-ES" sz="1600" b="0" i="0" u="none" strike="noStrike" cap="none" normalizeH="0" baseline="0" dirty="0" err="1">
+                <a:ln>
+                  <a:noFill/>
+                </a:ln>
+                <a:solidFill>
+                  <a:srgbClr val="000000"/>
+                </a:solidFill>
+                <a:effectLst/>
+                <a:latin typeface="Source Code Pro" panose="020B0509030403020204" pitchFamily="49" charset="0"/>
+              </a:rPr>
+              <a:t>mmmmm</a:t>
+            </a:r>
+            <a:r>
+              <a:rPr kumimoji="0" lang="es-ES" altLang="es-ES" sz="1600" b="0" i="0" u="none" strike="noStrike" cap="none" normalizeH="0" baseline="0" dirty="0">
+                <a:ln>
+                  <a:noFill/>
+                </a:ln>
+                <a:solidFill>
+                  <a:srgbClr val="999999"/>
+                </a:solidFill>
+                <a:effectLst/>
+                <a:latin typeface="Source Code Pro" panose="020B0509030403020204" pitchFamily="49" charset="0"/>
+              </a:rPr>
+              <a:t>&lt;/</a:t>
+            </a:r>
+            <a:r>
+              <a:rPr kumimoji="0" lang="es-ES" altLang="es-ES" sz="1600" b="0" i="0" u="none" strike="noStrike" cap="none" normalizeH="0" baseline="0" dirty="0">
+                <a:ln>
+                  <a:noFill/>
+                </a:ln>
+                <a:solidFill>
+                  <a:srgbClr val="BB3300"/>
+                </a:solidFill>
+                <a:effectLst/>
+                <a:latin typeface="Source Code Pro" panose="020B0509030403020204" pitchFamily="49" charset="0"/>
+              </a:rPr>
+              <a:t>p</a:t>
+            </a:r>
+            <a:r>
+              <a:rPr kumimoji="0" lang="es-ES" altLang="es-ES" sz="1600" b="0" i="0" u="none" strike="noStrike" cap="none" normalizeH="0" baseline="0" dirty="0">
+                <a:ln>
+                  <a:noFill/>
+                </a:ln>
+                <a:solidFill>
+                  <a:srgbClr val="999999"/>
+                </a:solidFill>
+                <a:effectLst/>
+                <a:latin typeface="Source Code Pro" panose="020B0509030403020204" pitchFamily="49" charset="0"/>
+              </a:rPr>
+              <a:t>&gt;</a:t>
+            </a:r>
+            <a:r>
+              <a:rPr kumimoji="0" lang="es-ES" altLang="es-ES" sz="1600" b="0" i="0" u="none" strike="noStrike" cap="none" normalizeH="0" baseline="0" dirty="0">
+                <a:ln>
+                  <a:noFill/>
+                </a:ln>
+                <a:solidFill>
+                  <a:srgbClr val="000000"/>
+                </a:solidFill>
+                <a:effectLst/>
+                <a:latin typeface="Source Code Pro" panose="020B0509030403020204" pitchFamily="49" charset="0"/>
+              </a:rPr>
+              <a:t> </a:t>
+            </a:r>
+          </a:p>
+          <a:p>
+            <a:pPr marL="0" marR="0" lvl="0" indent="0" algn="l" defTabSz="914400" rtl="0" eaLnBrk="0" fontAlgn="base" latinLnBrk="0" hangingPunct="0">
+              <a:lnSpc>
+                <a:spcPct val="100000"/>
+              </a:lnSpc>
+              <a:spcBef>
+                <a:spcPct val="0"/>
+              </a:spcBef>
+              <a:spcAft>
+                <a:spcPct val="0"/>
+              </a:spcAft>
+              <a:buClrTx/>
+              <a:buSzTx/>
+              <a:buFontTx/>
+              <a:buNone/>
+              <a:tabLst/>
+            </a:pPr>
+            <a:r>
+              <a:rPr kumimoji="0" lang="es-ES" altLang="es-ES" sz="1600" b="0" i="0" u="none" strike="noStrike" cap="none" normalizeH="0" baseline="0" dirty="0">
+                <a:ln>
+                  <a:noFill/>
+                </a:ln>
+                <a:solidFill>
+                  <a:srgbClr val="999999"/>
+                </a:solidFill>
+                <a:effectLst/>
+                <a:latin typeface="Source Code Pro" panose="020B0509030403020204" pitchFamily="49" charset="0"/>
+              </a:rPr>
+              <a:t>&lt;/</a:t>
+            </a:r>
+            <a:r>
+              <a:rPr kumimoji="0" lang="es-ES" altLang="es-ES" sz="1600" b="0" i="0" u="none" strike="noStrike" cap="none" normalizeH="0" baseline="0" dirty="0" err="1">
+                <a:ln>
+                  <a:noFill/>
+                </a:ln>
+                <a:solidFill>
+                  <a:srgbClr val="BB3300"/>
+                </a:solidFill>
+                <a:effectLst/>
+                <a:latin typeface="Source Code Pro" panose="020B0509030403020204" pitchFamily="49" charset="0"/>
+              </a:rPr>
+              <a:t>div</a:t>
+            </a:r>
+            <a:r>
+              <a:rPr kumimoji="0" lang="es-ES" altLang="es-ES" sz="1600" b="0" i="0" u="none" strike="noStrike" cap="none" normalizeH="0" baseline="0" dirty="0">
+                <a:ln>
+                  <a:noFill/>
+                </a:ln>
+                <a:solidFill>
+                  <a:srgbClr val="999999"/>
+                </a:solidFill>
+                <a:effectLst/>
+                <a:latin typeface="Source Code Pro" panose="020B0509030403020204" pitchFamily="49" charset="0"/>
+              </a:rPr>
+              <a:t>&gt;</a:t>
+            </a:r>
+            <a:r>
+              <a:rPr kumimoji="0" lang="es-ES" altLang="es-ES" sz="1600" b="0" i="0" u="none" strike="noStrike" cap="none" normalizeH="0" baseline="0" dirty="0">
+                <a:ln>
+                  <a:noFill/>
+                </a:ln>
+                <a:solidFill>
+                  <a:schemeClr val="tx1"/>
+                </a:solidFill>
+                <a:effectLst/>
+              </a:rPr>
+              <a:t> </a:t>
+            </a:r>
+            <a:endParaRPr kumimoji="0" lang="es-ES" altLang="es-ES" sz="1600" b="0" i="0" u="none" strike="noStrike" cap="none" normalizeH="0" baseline="0" dirty="0">
+              <a:ln>
+                <a:noFill/>
+              </a:ln>
+              <a:solidFill>
+                <a:schemeClr val="tx1"/>
+              </a:solidFill>
+              <a:effectLst/>
+              <a:latin typeface="Arial" panose="020B0604020202020204" pitchFamily="34" charset="0"/>
+            </a:endParaRPr>
+          </a:p>
+        </p:txBody>
+      </p:sp>
     </p:spTree>
     <p:extLst>
       <p:ext uri="{BB962C8B-B14F-4D97-AF65-F5344CB8AC3E}">
-        <p14:creationId xmlns:p14="http://schemas.microsoft.com/office/powerpoint/2010/main" val="1351089953"/>
+        <p14:creationId xmlns:p14="http://schemas.microsoft.com/office/powerpoint/2010/main" val="423295608"/>
       </p:ext>
     </p:extLst>
   </p:cSld>
@@ -26747,6 +28343,124 @@
           <p:cNvPr id="2" name="Título 1">
             <a:extLst>
               <a:ext uri="{FF2B5EF4-FFF2-40B4-BE49-F238E27FC236}">
+                <a16:creationId xmlns:a16="http://schemas.microsoft.com/office/drawing/2014/main" id="{34A87344-004A-4894-AB06-BCC475305E40}"/>
+              </a:ext>
+            </a:extLst>
+          </p:cNvPr>
+          <p:cNvSpPr>
+            <a:spLocks noGrp="1"/>
+          </p:cNvSpPr>
+          <p:nvPr>
+            <p:ph type="title"/>
+          </p:nvPr>
+        </p:nvSpPr>
+        <p:spPr>
+          <a:xfrm>
+            <a:off x="457200" y="371475"/>
+            <a:ext cx="8220075" cy="609253"/>
+          </a:xfrm>
+        </p:spPr>
+        <p:txBody>
+          <a:bodyPr/>
+          <a:lstStyle/>
+          <a:p>
+            <a:r>
+              <a:rPr lang="ca-ES" dirty="0" err="1"/>
+              <a:t>How</a:t>
+            </a:r>
+            <a:r>
+              <a:rPr lang="ca-ES" dirty="0"/>
+              <a:t> CSS </a:t>
+            </a:r>
+            <a:r>
+              <a:rPr lang="ca-ES" dirty="0" err="1"/>
+              <a:t>styles</a:t>
+            </a:r>
+            <a:r>
+              <a:rPr lang="ca-ES" dirty="0"/>
+              <a:t> </a:t>
+            </a:r>
+            <a:r>
+              <a:rPr lang="ca-ES" dirty="0" err="1"/>
+              <a:t>are</a:t>
+            </a:r>
+            <a:r>
+              <a:rPr lang="ca-ES" dirty="0"/>
+              <a:t> </a:t>
+            </a:r>
+            <a:r>
+              <a:rPr lang="ca-ES" dirty="0" err="1"/>
+              <a:t>used</a:t>
+            </a:r>
+            <a:endParaRPr lang="ca-ES" dirty="0"/>
+          </a:p>
+        </p:txBody>
+      </p:sp>
+      <p:pic>
+        <p:nvPicPr>
+          <p:cNvPr id="4" name="Imagen 3">
+            <a:extLst>
+              <a:ext uri="{FF2B5EF4-FFF2-40B4-BE49-F238E27FC236}">
+                <a16:creationId xmlns:a16="http://schemas.microsoft.com/office/drawing/2014/main" id="{11F061A5-C0BD-4679-B46D-D855BCC79171}"/>
+              </a:ext>
+            </a:extLst>
+          </p:cNvPr>
+          <p:cNvPicPr>
+            <a:picLocks noChangeAspect="1"/>
+          </p:cNvPicPr>
+          <p:nvPr/>
+        </p:nvPicPr>
+        <p:blipFill>
+          <a:blip r:embed="rId2"/>
+          <a:stretch>
+            <a:fillRect/>
+          </a:stretch>
+        </p:blipFill>
+        <p:spPr>
+          <a:xfrm>
+            <a:off x="323528" y="1124744"/>
+            <a:ext cx="8220075" cy="5499692"/>
+          </a:xfrm>
+          <a:prstGeom prst="rect">
+            <a:avLst/>
+          </a:prstGeom>
+        </p:spPr>
+      </p:pic>
+    </p:spTree>
+    <p:extLst>
+      <p:ext uri="{BB962C8B-B14F-4D97-AF65-F5344CB8AC3E}">
+        <p14:creationId xmlns:p14="http://schemas.microsoft.com/office/powerpoint/2010/main" val="1351089953"/>
+      </p:ext>
+    </p:extLst>
+  </p:cSld>
+  <p:clrMapOvr>
+    <a:masterClrMapping/>
+  </p:clrMapOvr>
+</p:sld>
+</file>
+
+<file path=ppt/slides/slide41.xml><?xml version="1.0" encoding="utf-8"?>
+<p:sld xmlns:a="http://schemas.openxmlformats.org/drawingml/2006/main" xmlns:r="http://schemas.openxmlformats.org/officeDocument/2006/relationships" xmlns:p="http://schemas.openxmlformats.org/presentationml/2006/main">
+  <p:cSld>
+    <p:spTree>
+      <p:nvGrpSpPr>
+        <p:cNvPr id="1" name=""/>
+        <p:cNvGrpSpPr/>
+        <p:nvPr/>
+      </p:nvGrpSpPr>
+      <p:grpSpPr>
+        <a:xfrm>
+          <a:off x="0" y="0"/>
+          <a:ext cx="0" cy="0"/>
+          <a:chOff x="0" y="0"/>
+          <a:chExt cx="0" cy="0"/>
+        </a:xfrm>
+      </p:grpSpPr>
+      <p:sp>
+        <p:nvSpPr>
+          <p:cNvPr id="2" name="Título 1">
+            <a:extLst>
+              <a:ext uri="{FF2B5EF4-FFF2-40B4-BE49-F238E27FC236}">
                 <a16:creationId xmlns:a16="http://schemas.microsoft.com/office/drawing/2014/main" id="{08EB747B-B1BE-447A-AD6B-4DC35DD5C471}"/>
               </a:ext>
             </a:extLst>
@@ -26815,16 +28529,7 @@
                 <a:latin typeface="Courier New" panose="02070309020205020404" pitchFamily="49" charset="0"/>
                 <a:cs typeface="Courier New" panose="02070309020205020404" pitchFamily="49" charset="0"/>
               </a:rPr>
-              <a:t>/* Applies to the entire body of the HTML document (except where overridden by more specific</a:t>
-            </a:r>
-          </a:p>
-          <a:p>
-            <a:r>
-              <a:rPr lang="en-US" sz="1400" dirty="0">
-                <a:latin typeface="Courier New" panose="02070309020205020404" pitchFamily="49" charset="0"/>
-                <a:cs typeface="Courier New" panose="02070309020205020404" pitchFamily="49" charset="0"/>
-              </a:rPr>
-              <a:t>selectors). */</a:t>
+              <a:t>/* Applies to the entire body of the HTML document (except where overridden by more specific selectors). */</a:t>
             </a:r>
           </a:p>
           <a:p>
@@ -26981,7 +28686,21 @@
                 <a:latin typeface="Courier New" panose="02070309020205020404" pitchFamily="49" charset="0"/>
                 <a:cs typeface="Courier New" panose="02070309020205020404" pitchFamily="49" charset="0"/>
               </a:rPr>
-              <a:t>/* Applies to all elements with &lt;... class="</a:t>
+              <a:t>/* Applies to </a:t>
+            </a:r>
+            <a:r>
+              <a:rPr lang="en-US" sz="1400" b="1" dirty="0">
+                <a:latin typeface="Courier New" panose="02070309020205020404" pitchFamily="49" charset="0"/>
+                <a:cs typeface="Courier New" panose="02070309020205020404" pitchFamily="49" charset="0"/>
+              </a:rPr>
+              <a:t>all elements </a:t>
+            </a:r>
+            <a:r>
+              <a:rPr lang="en-US" sz="1400" dirty="0">
+                <a:latin typeface="Courier New" panose="02070309020205020404" pitchFamily="49" charset="0"/>
+                <a:cs typeface="Courier New" panose="02070309020205020404" pitchFamily="49" charset="0"/>
+              </a:rPr>
+              <a:t>with &lt;... class="</a:t>
             </a:r>
             <a:r>
               <a:rPr lang="en-US" sz="1400" dirty="0" err="1">
@@ -27033,7 +28752,21 @@
                 <a:latin typeface="Courier New" panose="02070309020205020404" pitchFamily="49" charset="0"/>
                 <a:cs typeface="Courier New" panose="02070309020205020404" pitchFamily="49" charset="0"/>
               </a:rPr>
-              <a:t>/* Applies to the element with &lt;... id="</a:t>
+              <a:t>/* Applies to </a:t>
+            </a:r>
+            <a:r>
+              <a:rPr lang="en-US" sz="1400" b="1" dirty="0">
+                <a:latin typeface="Courier New" panose="02070309020205020404" pitchFamily="49" charset="0"/>
+                <a:cs typeface="Courier New" panose="02070309020205020404" pitchFamily="49" charset="0"/>
+              </a:rPr>
+              <a:t>the element </a:t>
+            </a:r>
+            <a:r>
+              <a:rPr lang="en-US" sz="1400" dirty="0">
+                <a:latin typeface="Courier New" panose="02070309020205020404" pitchFamily="49" charset="0"/>
+                <a:cs typeface="Courier New" panose="02070309020205020404" pitchFamily="49" charset="0"/>
+              </a:rPr>
+              <a:t>with &lt;... id="</a:t>
             </a:r>
             <a:r>
               <a:rPr lang="en-US" sz="1400" dirty="0" err="1">
@@ -27092,7 +28825,7 @@
 </p:sld>
 </file>
 
-<file path=ppt/slides/slide41.xml><?xml version="1.0" encoding="utf-8"?>
+<file path=ppt/slides/slide42.xml><?xml version="1.0" encoding="utf-8"?>
 <p:sld xmlns:a="http://schemas.openxmlformats.org/drawingml/2006/main" xmlns:r="http://schemas.openxmlformats.org/officeDocument/2006/relationships" xmlns:p="http://schemas.openxmlformats.org/presentationml/2006/main">
   <p:cSld>
     <p:spTree>
@@ -27152,7 +28885,7 @@
 </p:sld>
 </file>
 
-<file path=ppt/slides/slide42.xml><?xml version="1.0" encoding="utf-8"?>
+<file path=ppt/slides/slide43.xml><?xml version="1.0" encoding="utf-8"?>
 <p:sld xmlns:a="http://schemas.openxmlformats.org/drawingml/2006/main" xmlns:r="http://schemas.openxmlformats.org/officeDocument/2006/relationships" xmlns:p="http://schemas.openxmlformats.org/presentationml/2006/main">
   <p:cSld>
     <p:spTree>
@@ -27319,7 +29052,7 @@
             </a:pPr>
             <a:r>
               <a:rPr lang="en-US" sz="2400" dirty="0"/>
-              <a:t>Link both CSS to one of the pages. See the effects of cascading</a:t>
+              <a:t>Link both CSS to one of the pages. See the effects of cascading.</a:t>
             </a:r>
             <a:endParaRPr lang="ca-ES" sz="2400" dirty="0"/>
           </a:p>
@@ -27493,7 +29226,7 @@
               </a:tabLst>
             </a:pPr>
             <a:r>
-              <a:rPr lang="es-ES" sz="3200" i="1">
+              <a:rPr lang="es-ES" sz="3200" i="1" dirty="0">
                 <a:solidFill>
                   <a:srgbClr val="CCCCFF"/>
                 </a:solidFill>
@@ -27536,16 +29269,34 @@
               </a:tabLst>
             </a:pPr>
             <a:r>
-              <a:rPr lang="es-ES" sz="3200">
+              <a:rPr lang="es-ES" sz="3200" dirty="0">
                 <a:solidFill>
                   <a:srgbClr val="000000"/>
                 </a:solidFill>
                 <a:latin typeface="Arial" charset="0"/>
               </a:rPr>
-              <a:t>HTML5 Introduction (MOOC): </a:t>
-            </a:r>
-            <a:r>
-              <a:rPr lang="es-ES" sz="3200">
+              <a:t>HTML5 </a:t>
+            </a:r>
+            <a:r>
+              <a:rPr lang="es-ES" sz="3200" dirty="0" err="1">
+                <a:solidFill>
+                  <a:srgbClr val="000000"/>
+                </a:solidFill>
+                <a:latin typeface="Arial" charset="0"/>
+              </a:rPr>
+              <a:t>Introduction</a:t>
+            </a:r>
+            <a:r>
+              <a:rPr lang="es-ES" sz="3200" dirty="0">
+                <a:solidFill>
+                  <a:srgbClr val="000000"/>
+                </a:solidFill>
+                <a:latin typeface="Arial" charset="0"/>
+              </a:rPr>
+              <a:t> (MOOC): </a:t>
+            </a:r>
+            <a:r>
+              <a:rPr lang="es-ES" sz="3200" dirty="0">
                 <a:solidFill>
                   <a:srgbClr val="CCCCFF"/>
                 </a:solidFill>
@@ -27588,13 +29339,13 @@
               </a:tabLst>
             </a:pPr>
             <a:r>
-              <a:rPr lang="es-ES" sz="3200">
+              <a:rPr lang="es-ES" sz="3200" dirty="0">
                 <a:solidFill>
                   <a:srgbClr val="000000"/>
                 </a:solidFill>
                 <a:latin typeface="Arial" charset="0"/>
               </a:rPr>
-              <a:t>google</a:t>
+              <a:t>Google</a:t>
             </a:r>
           </a:p>
         </p:txBody>
@@ -30958,20 +32709,14 @@
               </a:tabLst>
             </a:pPr>
             <a:r>
-              <a:rPr lang="es-ES" sz="2600" dirty="0" err="1">
+              <a:rPr lang="es-ES" sz="2600" dirty="0">
                 <a:solidFill>
                   <a:srgbClr val="000000"/>
                 </a:solidFill>
                 <a:latin typeface="Arial" charset="0"/>
               </a:rPr>
-              <a:t>etc</a:t>
-            </a:r>
-            <a:endParaRPr lang="es-ES" sz="2600" dirty="0">
-              <a:solidFill>
-                <a:srgbClr val="000000"/>
-              </a:solidFill>
-              <a:latin typeface="Arial" charset="0"/>
-            </a:endParaRPr>
+              <a:t>Etc.</a:t>
+            </a:r>
           </a:p>
         </p:txBody>
       </p:sp>

</xml_diff>